<commit_message>
Add a few slides
</commit_message>
<xml_diff>
--- a/DeLAutreCoteDuMiroir.pptx
+++ b/DeLAutreCoteDuMiroir.pptx
@@ -5,15 +5,20 @@
     <p:sldMasterId id="2147483648" r:id="rId1"/>
   </p:sldMasterIdLst>
   <p:notesMasterIdLst>
-    <p:notesMasterId r:id="rId8"/>
+    <p:notesMasterId r:id="rId13"/>
   </p:notesMasterIdLst>
   <p:sldIdLst>
     <p:sldId id="256" r:id="rId2"/>
     <p:sldId id="260" r:id="rId3"/>
     <p:sldId id="261" r:id="rId4"/>
-    <p:sldId id="264" r:id="rId5"/>
-    <p:sldId id="263" r:id="rId6"/>
-    <p:sldId id="262" r:id="rId7"/>
+    <p:sldId id="266" r:id="rId5"/>
+    <p:sldId id="267" r:id="rId6"/>
+    <p:sldId id="264" r:id="rId7"/>
+    <p:sldId id="263" r:id="rId8"/>
+    <p:sldId id="269" r:id="rId9"/>
+    <p:sldId id="265" r:id="rId10"/>
+    <p:sldId id="268" r:id="rId11"/>
+    <p:sldId id="262" r:id="rId12"/>
   </p:sldIdLst>
   <p:sldSz cx="12192000" cy="6858000"/>
   <p:notesSz cx="6858000" cy="9144000"/>
@@ -202,7 +207,7 @@
           <a:p>
             <a:fld id="{83BBAB19-0C91-4298-A871-C5B9360137CE}" type="datetimeFigureOut">
               <a:rPr lang="fr-FR" smtClean="0"/>
-              <a:t>30/08/2021</a:t>
+              <a:t>11/09/2021</a:t>
             </a:fld>
             <a:endParaRPr lang="fr-FR"/>
           </a:p>
@@ -560,6 +565,198 @@
 </p:notes>
 </file>
 
+<file path=ppt/notesSlides/notesSlide10.xml><?xml version="1.0" encoding="utf-8"?>
+<p:notes xmlns:a="http://schemas.openxmlformats.org/drawingml/2006/main" xmlns:r="http://schemas.openxmlformats.org/officeDocument/2006/relationships" xmlns:p="http://schemas.openxmlformats.org/presentationml/2006/main">
+  <p:cSld>
+    <p:spTree>
+      <p:nvGrpSpPr>
+        <p:cNvPr id="1" name=""/>
+        <p:cNvGrpSpPr/>
+        <p:nvPr/>
+      </p:nvGrpSpPr>
+      <p:grpSpPr>
+        <a:xfrm>
+          <a:off x="0" y="0"/>
+          <a:ext cx="0" cy="0"/>
+          <a:chOff x="0" y="0"/>
+          <a:chExt cx="0" cy="0"/>
+        </a:xfrm>
+      </p:grpSpPr>
+      <p:sp>
+        <p:nvSpPr>
+          <p:cNvPr id="2" name="Slide Image Placeholder 1"/>
+          <p:cNvSpPr>
+            <a:spLocks noGrp="1" noRot="1" noChangeAspect="1"/>
+          </p:cNvSpPr>
+          <p:nvPr>
+            <p:ph type="sldImg"/>
+          </p:nvPr>
+        </p:nvSpPr>
+        <p:spPr/>
+      </p:sp>
+      <p:sp>
+        <p:nvSpPr>
+          <p:cNvPr id="3" name="Notes Placeholder 2"/>
+          <p:cNvSpPr>
+            <a:spLocks noGrp="1"/>
+          </p:cNvSpPr>
+          <p:nvPr>
+            <p:ph type="body" idx="1"/>
+          </p:nvPr>
+        </p:nvSpPr>
+        <p:spPr/>
+        <p:txBody>
+          <a:bodyPr/>
+          <a:lstStyle/>
+          <a:p>
+            <a:endParaRPr lang="fr-FR" dirty="0"/>
+          </a:p>
+          <a:p>
+            <a:endParaRPr lang="fr-FR" dirty="0"/>
+          </a:p>
+          <a:p>
+            <a:r>
+              <a:rPr lang="fr-FR" dirty="0"/>
+              <a:t>https://www.google.com/url?sa=i&amp;url=https%3A%2F%2Fwww.papergeek.fr%2Fmatrix-resurrections-voici-la-folle-bande-annonce-du-4e-film-de-la-saga-2454400&amp;psig=AOvVaw1o7Y-Xsy0HiH_teeuKZfBk&amp;ust=1631438660817000&amp;source=images&amp;cd=vfe&amp;ved=0CAkQjRxqFwoTCKDG4eTM9vICFQAAAAAdAAAAABAJ</a:t>
+            </a:r>
+          </a:p>
+        </p:txBody>
+      </p:sp>
+      <p:sp>
+        <p:nvSpPr>
+          <p:cNvPr id="4" name="Slide Number Placeholder 3"/>
+          <p:cNvSpPr>
+            <a:spLocks noGrp="1"/>
+          </p:cNvSpPr>
+          <p:nvPr>
+            <p:ph type="sldNum" sz="quarter" idx="5"/>
+          </p:nvPr>
+        </p:nvSpPr>
+        <p:spPr/>
+        <p:txBody>
+          <a:bodyPr/>
+          <a:lstStyle/>
+          <a:p>
+            <a:fld id="{788D8A45-B12B-40AF-A07B-2EBC15495A4C}" type="slidenum">
+              <a:rPr lang="fr-FR" smtClean="0"/>
+              <a:t>10</a:t>
+            </a:fld>
+            <a:endParaRPr lang="fr-FR"/>
+          </a:p>
+        </p:txBody>
+      </p:sp>
+    </p:spTree>
+    <p:extLst>
+      <p:ext uri="{BB962C8B-B14F-4D97-AF65-F5344CB8AC3E}">
+        <p14:creationId xmlns:p14="http://schemas.microsoft.com/office/powerpoint/2010/main" val="2209606645"/>
+      </p:ext>
+    </p:extLst>
+  </p:cSld>
+  <p:clrMapOvr>
+    <a:masterClrMapping/>
+  </p:clrMapOvr>
+</p:notes>
+</file>
+
+<file path=ppt/notesSlides/notesSlide11.xml><?xml version="1.0" encoding="utf-8"?>
+<p:notes xmlns:a="http://schemas.openxmlformats.org/drawingml/2006/main" xmlns:r="http://schemas.openxmlformats.org/officeDocument/2006/relationships" xmlns:p="http://schemas.openxmlformats.org/presentationml/2006/main">
+  <p:cSld>
+    <p:spTree>
+      <p:nvGrpSpPr>
+        <p:cNvPr id="1" name=""/>
+        <p:cNvGrpSpPr/>
+        <p:nvPr/>
+      </p:nvGrpSpPr>
+      <p:grpSpPr>
+        <a:xfrm>
+          <a:off x="0" y="0"/>
+          <a:ext cx="0" cy="0"/>
+          <a:chOff x="0" y="0"/>
+          <a:chExt cx="0" cy="0"/>
+        </a:xfrm>
+      </p:grpSpPr>
+      <p:sp>
+        <p:nvSpPr>
+          <p:cNvPr id="2" name="Slide Image Placeholder 1"/>
+          <p:cNvSpPr>
+            <a:spLocks noGrp="1" noRot="1" noChangeAspect="1"/>
+          </p:cNvSpPr>
+          <p:nvPr>
+            <p:ph type="sldImg"/>
+          </p:nvPr>
+        </p:nvSpPr>
+        <p:spPr/>
+      </p:sp>
+      <p:sp>
+        <p:nvSpPr>
+          <p:cNvPr id="3" name="Notes Placeholder 2"/>
+          <p:cNvSpPr>
+            <a:spLocks noGrp="1"/>
+          </p:cNvSpPr>
+          <p:nvPr>
+            <p:ph type="body" idx="1"/>
+          </p:nvPr>
+        </p:nvSpPr>
+        <p:spPr/>
+        <p:txBody>
+          <a:bodyPr/>
+          <a:lstStyle/>
+          <a:p>
+            <a:endParaRPr lang="fr-FR" dirty="0"/>
+          </a:p>
+          <a:p>
+            <a:endParaRPr lang="fr-FR" dirty="0"/>
+          </a:p>
+          <a:p>
+            <a:endParaRPr lang="fr-FR" dirty="0"/>
+          </a:p>
+          <a:p>
+            <a:endParaRPr lang="fr-FR" dirty="0"/>
+          </a:p>
+          <a:p>
+            <a:r>
+              <a:rPr lang="fr-FR" dirty="0"/>
+              <a:t>https://images.app.goo.gl/eU9Jrtu8zn2qWMBo9</a:t>
+            </a:r>
+          </a:p>
+        </p:txBody>
+      </p:sp>
+      <p:sp>
+        <p:nvSpPr>
+          <p:cNvPr id="4" name="Slide Number Placeholder 3"/>
+          <p:cNvSpPr>
+            <a:spLocks noGrp="1"/>
+          </p:cNvSpPr>
+          <p:nvPr>
+            <p:ph type="sldNum" sz="quarter" idx="5"/>
+          </p:nvPr>
+        </p:nvSpPr>
+        <p:spPr/>
+        <p:txBody>
+          <a:bodyPr/>
+          <a:lstStyle/>
+          <a:p>
+            <a:fld id="{788D8A45-B12B-40AF-A07B-2EBC15495A4C}" type="slidenum">
+              <a:rPr lang="fr-FR" smtClean="0"/>
+              <a:t>11</a:t>
+            </a:fld>
+            <a:endParaRPr lang="fr-FR"/>
+          </a:p>
+        </p:txBody>
+      </p:sp>
+    </p:spTree>
+    <p:extLst>
+      <p:ext uri="{BB962C8B-B14F-4D97-AF65-F5344CB8AC3E}">
+        <p14:creationId xmlns:p14="http://schemas.microsoft.com/office/powerpoint/2010/main" val="1677049641"/>
+      </p:ext>
+    </p:extLst>
+  </p:cSld>
+  <p:clrMapOvr>
+    <a:masterClrMapping/>
+  </p:clrMapOvr>
+</p:notes>
+</file>
+
 <file path=ppt/notesSlides/notesSlide2.xml><?xml version="1.0" encoding="utf-8"?>
 <p:notes xmlns:a="http://schemas.openxmlformats.org/drawingml/2006/main" xmlns:r="http://schemas.openxmlformats.org/officeDocument/2006/relationships" xmlns:p="http://schemas.openxmlformats.org/presentationml/2006/main">
   <p:cSld>
@@ -814,9 +1011,12 @@
             <a:endParaRPr lang="fr-FR" dirty="0"/>
           </a:p>
           <a:p>
+            <a:endParaRPr lang="fr-FR" dirty="0"/>
+          </a:p>
+          <a:p>
             <a:r>
               <a:rPr lang="fr-FR" dirty="0"/>
-              <a:t>https://www.google.com/url?sa=i&amp;url=https%3A%2F%2Fwww.letoiledulac.com%2Feconomie%2Fmessieurs-les-garagistes%2F&amp;psig=AOvVaw34Wo-gcIGb-PJP56gTnWSd&amp;ust=1630442329164000&amp;source=images&amp;cd=vfe&amp;ved=0CAkQjRxqFwoTCKDBqZ7N2fICFQAAAAAdAAAAABAE</a:t>
+              <a:t>https://www.google.com/url?sa=i&amp;url=https%3A%2F%2Fstephan.services%2Fpodcast-18-developpeur-informatique%2F&amp;psig=AOvVaw2JNxcnP5tq7pti9YVbW8Ou&amp;ust=1631437390810000&amp;source=images&amp;cd=vfe&amp;ved=0CAkQjRxqFwoTCIi3gIjI9vICFQAAAAAdAAAAABAo</a:t>
             </a:r>
           </a:p>
         </p:txBody>
@@ -847,7 +1047,7 @@
     </p:spTree>
     <p:extLst>
       <p:ext uri="{BB962C8B-B14F-4D97-AF65-F5344CB8AC3E}">
-        <p14:creationId xmlns:p14="http://schemas.microsoft.com/office/powerpoint/2010/main" val="947668941"/>
+        <p14:creationId xmlns:p14="http://schemas.microsoft.com/office/powerpoint/2010/main" val="1705600790"/>
       </p:ext>
     </p:extLst>
   </p:cSld>
@@ -907,12 +1107,9 @@
             <a:endParaRPr lang="fr-FR" dirty="0"/>
           </a:p>
           <a:p>
-            <a:endParaRPr lang="fr-FR" dirty="0"/>
-          </a:p>
-          <a:p>
             <a:r>
               <a:rPr lang="fr-FR" dirty="0"/>
-              <a:t>https://www.google.com/url?sa=i&amp;url=https%3A%2F%2Fwww.meilleursbrokers.com%2Fblog%2F2018%2F05%2F14%2Fcomment-devenir-trader-%25C3%25A9tudes-et-dipl%25C3%25B4mes%2F&amp;psig=AOvVaw2hSaifPFX-PPqCZ7bROabC&amp;ust=1630442766372000&amp;source=images&amp;cd=vfe&amp;ved=0CAkQjRxqFwoTCJCZ6OPO2fICFQAAAAAdAAAAABAD</a:t>
+              <a:t>https://www.google.com/url?sa=i&amp;url=https%3A%2F%2Fwww.ionos.fr%2Fdigitalguide%2Fsites-internet%2Fdeveloppement-web%2Fquest-ce-que-le-behavior-driven-development%2F&amp;psig=AOvVaw0-8YDaHbea7Z01BeTM8FmZ&amp;ust=1631437801080000&amp;source=images&amp;cd=vfe&amp;ved=0CAkQjRxqFwoTCLjvhM_J9vICFQAAAAAdAAAAABAD</a:t>
             </a:r>
           </a:p>
         </p:txBody>
@@ -943,7 +1140,7 @@
     </p:spTree>
     <p:extLst>
       <p:ext uri="{BB962C8B-B14F-4D97-AF65-F5344CB8AC3E}">
-        <p14:creationId xmlns:p14="http://schemas.microsoft.com/office/powerpoint/2010/main" val="3601457384"/>
+        <p14:creationId xmlns:p14="http://schemas.microsoft.com/office/powerpoint/2010/main" val="1849350479"/>
       </p:ext>
     </p:extLst>
   </p:cSld>
@@ -1006,12 +1203,9 @@
             <a:endParaRPr lang="fr-FR" dirty="0"/>
           </a:p>
           <a:p>
-            <a:endParaRPr lang="fr-FR" dirty="0"/>
-          </a:p>
-          <a:p>
             <a:r>
               <a:rPr lang="fr-FR" dirty="0"/>
-              <a:t>https://images.app.goo.gl/eU9Jrtu8zn2qWMBo9</a:t>
+              <a:t>https://www.google.com/url?sa=i&amp;url=https%3A%2F%2Fwww.letoiledulac.com%2Feconomie%2Fmessieurs-les-garagistes%2F&amp;psig=AOvVaw34Wo-gcIGb-PJP56gTnWSd&amp;ust=1630442329164000&amp;source=images&amp;cd=vfe&amp;ved=0CAkQjRxqFwoTCKDBqZ7N2fICFQAAAAAdAAAAABAE</a:t>
             </a:r>
           </a:p>
         </p:txBody>
@@ -1042,7 +1236,295 @@
     </p:spTree>
     <p:extLst>
       <p:ext uri="{BB962C8B-B14F-4D97-AF65-F5344CB8AC3E}">
-        <p14:creationId xmlns:p14="http://schemas.microsoft.com/office/powerpoint/2010/main" val="1677049641"/>
+        <p14:creationId xmlns:p14="http://schemas.microsoft.com/office/powerpoint/2010/main" val="947668941"/>
+      </p:ext>
+    </p:extLst>
+  </p:cSld>
+  <p:clrMapOvr>
+    <a:masterClrMapping/>
+  </p:clrMapOvr>
+</p:notes>
+</file>
+
+<file path=ppt/notesSlides/notesSlide7.xml><?xml version="1.0" encoding="utf-8"?>
+<p:notes xmlns:a="http://schemas.openxmlformats.org/drawingml/2006/main" xmlns:r="http://schemas.openxmlformats.org/officeDocument/2006/relationships" xmlns:p="http://schemas.openxmlformats.org/presentationml/2006/main">
+  <p:cSld>
+    <p:spTree>
+      <p:nvGrpSpPr>
+        <p:cNvPr id="1" name=""/>
+        <p:cNvGrpSpPr/>
+        <p:nvPr/>
+      </p:nvGrpSpPr>
+      <p:grpSpPr>
+        <a:xfrm>
+          <a:off x="0" y="0"/>
+          <a:ext cx="0" cy="0"/>
+          <a:chOff x="0" y="0"/>
+          <a:chExt cx="0" cy="0"/>
+        </a:xfrm>
+      </p:grpSpPr>
+      <p:sp>
+        <p:nvSpPr>
+          <p:cNvPr id="2" name="Slide Image Placeholder 1"/>
+          <p:cNvSpPr>
+            <a:spLocks noGrp="1" noRot="1" noChangeAspect="1"/>
+          </p:cNvSpPr>
+          <p:nvPr>
+            <p:ph type="sldImg"/>
+          </p:nvPr>
+        </p:nvSpPr>
+        <p:spPr/>
+      </p:sp>
+      <p:sp>
+        <p:nvSpPr>
+          <p:cNvPr id="3" name="Notes Placeholder 2"/>
+          <p:cNvSpPr>
+            <a:spLocks noGrp="1"/>
+          </p:cNvSpPr>
+          <p:nvPr>
+            <p:ph type="body" idx="1"/>
+          </p:nvPr>
+        </p:nvSpPr>
+        <p:spPr/>
+        <p:txBody>
+          <a:bodyPr/>
+          <a:lstStyle/>
+          <a:p>
+            <a:endParaRPr lang="fr-FR" dirty="0"/>
+          </a:p>
+          <a:p>
+            <a:endParaRPr lang="fr-FR" dirty="0"/>
+          </a:p>
+          <a:p>
+            <a:endParaRPr lang="fr-FR" dirty="0"/>
+          </a:p>
+          <a:p>
+            <a:r>
+              <a:rPr lang="fr-FR" dirty="0"/>
+              <a:t>https://www.google.com/url?sa=i&amp;url=https%3A%2F%2Fwww.meilleursbrokers.com%2Fblog%2F2018%2F05%2F14%2Fcomment-devenir-trader-%25C3%25A9tudes-et-dipl%25C3%25B4mes%2F&amp;psig=AOvVaw2hSaifPFX-PPqCZ7bROabC&amp;ust=1630442766372000&amp;source=images&amp;cd=vfe&amp;ved=0CAkQjRxqFwoTCJCZ6OPO2fICFQAAAAAdAAAAABAD</a:t>
+            </a:r>
+          </a:p>
+        </p:txBody>
+      </p:sp>
+      <p:sp>
+        <p:nvSpPr>
+          <p:cNvPr id="4" name="Slide Number Placeholder 3"/>
+          <p:cNvSpPr>
+            <a:spLocks noGrp="1"/>
+          </p:cNvSpPr>
+          <p:nvPr>
+            <p:ph type="sldNum" sz="quarter" idx="5"/>
+          </p:nvPr>
+        </p:nvSpPr>
+        <p:spPr/>
+        <p:txBody>
+          <a:bodyPr/>
+          <a:lstStyle/>
+          <a:p>
+            <a:fld id="{788D8A45-B12B-40AF-A07B-2EBC15495A4C}" type="slidenum">
+              <a:rPr lang="fr-FR" smtClean="0"/>
+              <a:t>7</a:t>
+            </a:fld>
+            <a:endParaRPr lang="fr-FR"/>
+          </a:p>
+        </p:txBody>
+      </p:sp>
+    </p:spTree>
+    <p:extLst>
+      <p:ext uri="{BB962C8B-B14F-4D97-AF65-F5344CB8AC3E}">
+        <p14:creationId xmlns:p14="http://schemas.microsoft.com/office/powerpoint/2010/main" val="3601457384"/>
+      </p:ext>
+    </p:extLst>
+  </p:cSld>
+  <p:clrMapOvr>
+    <a:masterClrMapping/>
+  </p:clrMapOvr>
+</p:notes>
+</file>
+
+<file path=ppt/notesSlides/notesSlide8.xml><?xml version="1.0" encoding="utf-8"?>
+<p:notes xmlns:a="http://schemas.openxmlformats.org/drawingml/2006/main" xmlns:r="http://schemas.openxmlformats.org/officeDocument/2006/relationships" xmlns:p="http://schemas.openxmlformats.org/presentationml/2006/main">
+  <p:cSld>
+    <p:spTree>
+      <p:nvGrpSpPr>
+        <p:cNvPr id="1" name=""/>
+        <p:cNvGrpSpPr/>
+        <p:nvPr/>
+      </p:nvGrpSpPr>
+      <p:grpSpPr>
+        <a:xfrm>
+          <a:off x="0" y="0"/>
+          <a:ext cx="0" cy="0"/>
+          <a:chOff x="0" y="0"/>
+          <a:chExt cx="0" cy="0"/>
+        </a:xfrm>
+      </p:grpSpPr>
+      <p:sp>
+        <p:nvSpPr>
+          <p:cNvPr id="2" name="Slide Image Placeholder 1"/>
+          <p:cNvSpPr>
+            <a:spLocks noGrp="1" noRot="1" noChangeAspect="1"/>
+          </p:cNvSpPr>
+          <p:nvPr>
+            <p:ph type="sldImg"/>
+          </p:nvPr>
+        </p:nvSpPr>
+        <p:spPr/>
+      </p:sp>
+      <p:sp>
+        <p:nvSpPr>
+          <p:cNvPr id="3" name="Notes Placeholder 2"/>
+          <p:cNvSpPr>
+            <a:spLocks noGrp="1"/>
+          </p:cNvSpPr>
+          <p:nvPr>
+            <p:ph type="body" idx="1"/>
+          </p:nvPr>
+        </p:nvSpPr>
+        <p:spPr/>
+        <p:txBody>
+          <a:bodyPr/>
+          <a:lstStyle/>
+          <a:p>
+            <a:endParaRPr lang="fr-FR" dirty="0"/>
+          </a:p>
+          <a:p>
+            <a:endParaRPr lang="fr-FR" dirty="0"/>
+          </a:p>
+          <a:p>
+            <a:endParaRPr lang="fr-FR" dirty="0"/>
+          </a:p>
+          <a:p>
+            <a:r>
+              <a:rPr lang="fr-FR" dirty="0"/>
+              <a:t>https://www.google.com/url?sa=i&amp;url=https%3A%2F%2Fwww.meilleursbrokers.com%2Fblog%2F2018%2F05%2F14%2Fcomment-devenir-trader-%25C3%25A9tudes-et-dipl%25C3%25B4mes%2F&amp;psig=AOvVaw2hSaifPFX-PPqCZ7bROabC&amp;ust=1630442766372000&amp;source=images&amp;cd=vfe&amp;ved=0CAkQjRxqFwoTCJCZ6OPO2fICFQAAAAAdAAAAABAD</a:t>
+            </a:r>
+          </a:p>
+        </p:txBody>
+      </p:sp>
+      <p:sp>
+        <p:nvSpPr>
+          <p:cNvPr id="4" name="Slide Number Placeholder 3"/>
+          <p:cNvSpPr>
+            <a:spLocks noGrp="1"/>
+          </p:cNvSpPr>
+          <p:nvPr>
+            <p:ph type="sldNum" sz="quarter" idx="5"/>
+          </p:nvPr>
+        </p:nvSpPr>
+        <p:spPr/>
+        <p:txBody>
+          <a:bodyPr/>
+          <a:lstStyle/>
+          <a:p>
+            <a:fld id="{788D8A45-B12B-40AF-A07B-2EBC15495A4C}" type="slidenum">
+              <a:rPr lang="fr-FR" smtClean="0"/>
+              <a:t>8</a:t>
+            </a:fld>
+            <a:endParaRPr lang="fr-FR"/>
+          </a:p>
+        </p:txBody>
+      </p:sp>
+    </p:spTree>
+    <p:extLst>
+      <p:ext uri="{BB962C8B-B14F-4D97-AF65-F5344CB8AC3E}">
+        <p14:creationId xmlns:p14="http://schemas.microsoft.com/office/powerpoint/2010/main" val="1322526275"/>
+      </p:ext>
+    </p:extLst>
+  </p:cSld>
+  <p:clrMapOvr>
+    <a:masterClrMapping/>
+  </p:clrMapOvr>
+</p:notes>
+</file>
+
+<file path=ppt/notesSlides/notesSlide9.xml><?xml version="1.0" encoding="utf-8"?>
+<p:notes xmlns:a="http://schemas.openxmlformats.org/drawingml/2006/main" xmlns:r="http://schemas.openxmlformats.org/officeDocument/2006/relationships" xmlns:p="http://schemas.openxmlformats.org/presentationml/2006/main">
+  <p:cSld>
+    <p:spTree>
+      <p:nvGrpSpPr>
+        <p:cNvPr id="1" name=""/>
+        <p:cNvGrpSpPr/>
+        <p:nvPr/>
+      </p:nvGrpSpPr>
+      <p:grpSpPr>
+        <a:xfrm>
+          <a:off x="0" y="0"/>
+          <a:ext cx="0" cy="0"/>
+          <a:chOff x="0" y="0"/>
+          <a:chExt cx="0" cy="0"/>
+        </a:xfrm>
+      </p:grpSpPr>
+      <p:sp>
+        <p:nvSpPr>
+          <p:cNvPr id="2" name="Slide Image Placeholder 1"/>
+          <p:cNvSpPr>
+            <a:spLocks noGrp="1" noRot="1" noChangeAspect="1"/>
+          </p:cNvSpPr>
+          <p:nvPr>
+            <p:ph type="sldImg"/>
+          </p:nvPr>
+        </p:nvSpPr>
+        <p:spPr/>
+      </p:sp>
+      <p:sp>
+        <p:nvSpPr>
+          <p:cNvPr id="3" name="Notes Placeholder 2"/>
+          <p:cNvSpPr>
+            <a:spLocks noGrp="1"/>
+          </p:cNvSpPr>
+          <p:nvPr>
+            <p:ph type="body" idx="1"/>
+          </p:nvPr>
+        </p:nvSpPr>
+        <p:spPr/>
+        <p:txBody>
+          <a:bodyPr/>
+          <a:lstStyle/>
+          <a:p>
+            <a:endParaRPr lang="fr-FR" dirty="0"/>
+          </a:p>
+          <a:p>
+            <a:endParaRPr lang="fr-FR" dirty="0"/>
+          </a:p>
+          <a:p>
+            <a:endParaRPr lang="fr-FR" dirty="0"/>
+          </a:p>
+          <a:p>
+            <a:r>
+              <a:rPr lang="fr-FR" dirty="0"/>
+              <a:t>https://www.google.com/url?sa=i&amp;url=https%3A%2F%2Fstock.adobe.com%2Ffr%2Fsearch%3Fk%3Dblas%25C3%25A9&amp;psig=AOvVaw1LJRkPkwsgWTLzHzDv1PTy&amp;ust=1630443155636000&amp;source=images&amp;cd=vfe&amp;ved=0CAkQjRxqFwoTCLjUiJ3Q2fICFQAAAAAdAAAAABAD</a:t>
+            </a:r>
+          </a:p>
+        </p:txBody>
+      </p:sp>
+      <p:sp>
+        <p:nvSpPr>
+          <p:cNvPr id="4" name="Slide Number Placeholder 3"/>
+          <p:cNvSpPr>
+            <a:spLocks noGrp="1"/>
+          </p:cNvSpPr>
+          <p:nvPr>
+            <p:ph type="sldNum" sz="quarter" idx="5"/>
+          </p:nvPr>
+        </p:nvSpPr>
+        <p:spPr/>
+        <p:txBody>
+          <a:bodyPr/>
+          <a:lstStyle/>
+          <a:p>
+            <a:fld id="{788D8A45-B12B-40AF-A07B-2EBC15495A4C}" type="slidenum">
+              <a:rPr lang="fr-FR" smtClean="0"/>
+              <a:t>9</a:t>
+            </a:fld>
+            <a:endParaRPr lang="fr-FR"/>
+          </a:p>
+        </p:txBody>
+      </p:sp>
+    </p:spTree>
+    <p:extLst>
+      <p:ext uri="{BB962C8B-B14F-4D97-AF65-F5344CB8AC3E}">
+        <p14:creationId xmlns:p14="http://schemas.microsoft.com/office/powerpoint/2010/main" val="3818338646"/>
       </p:ext>
     </p:extLst>
   </p:cSld>
@@ -1201,7 +1683,7 @@
           <a:p>
             <a:fld id="{2E0450E2-BB8E-48D1-94E1-E4F675E29F3B}" type="datetimeFigureOut">
               <a:rPr lang="fr-FR" smtClean="0"/>
-              <a:t>30/08/2021</a:t>
+              <a:t>11/09/2021</a:t>
             </a:fld>
             <a:endParaRPr lang="fr-FR"/>
           </a:p>
@@ -1401,7 +1883,7 @@
           <a:p>
             <a:fld id="{2E0450E2-BB8E-48D1-94E1-E4F675E29F3B}" type="datetimeFigureOut">
               <a:rPr lang="fr-FR" smtClean="0"/>
-              <a:t>30/08/2021</a:t>
+              <a:t>11/09/2021</a:t>
             </a:fld>
             <a:endParaRPr lang="fr-FR"/>
           </a:p>
@@ -1611,7 +2093,7 @@
           <a:p>
             <a:fld id="{2E0450E2-BB8E-48D1-94E1-E4F675E29F3B}" type="datetimeFigureOut">
               <a:rPr lang="fr-FR" smtClean="0"/>
-              <a:t>30/08/2021</a:t>
+              <a:t>11/09/2021</a:t>
             </a:fld>
             <a:endParaRPr lang="fr-FR"/>
           </a:p>
@@ -1811,7 +2293,7 @@
           <a:p>
             <a:fld id="{2E0450E2-BB8E-48D1-94E1-E4F675E29F3B}" type="datetimeFigureOut">
               <a:rPr lang="fr-FR" smtClean="0"/>
-              <a:t>30/08/2021</a:t>
+              <a:t>11/09/2021</a:t>
             </a:fld>
             <a:endParaRPr lang="fr-FR"/>
           </a:p>
@@ -2087,7 +2569,7 @@
           <a:p>
             <a:fld id="{2E0450E2-BB8E-48D1-94E1-E4F675E29F3B}" type="datetimeFigureOut">
               <a:rPr lang="fr-FR" smtClean="0"/>
-              <a:t>30/08/2021</a:t>
+              <a:t>11/09/2021</a:t>
             </a:fld>
             <a:endParaRPr lang="fr-FR"/>
           </a:p>
@@ -2355,7 +2837,7 @@
           <a:p>
             <a:fld id="{2E0450E2-BB8E-48D1-94E1-E4F675E29F3B}" type="datetimeFigureOut">
               <a:rPr lang="fr-FR" smtClean="0"/>
-              <a:t>30/08/2021</a:t>
+              <a:t>11/09/2021</a:t>
             </a:fld>
             <a:endParaRPr lang="fr-FR"/>
           </a:p>
@@ -2770,7 +3252,7 @@
           <a:p>
             <a:fld id="{2E0450E2-BB8E-48D1-94E1-E4F675E29F3B}" type="datetimeFigureOut">
               <a:rPr lang="fr-FR" smtClean="0"/>
-              <a:t>30/08/2021</a:t>
+              <a:t>11/09/2021</a:t>
             </a:fld>
             <a:endParaRPr lang="fr-FR"/>
           </a:p>
@@ -2912,7 +3394,7 @@
           <a:p>
             <a:fld id="{2E0450E2-BB8E-48D1-94E1-E4F675E29F3B}" type="datetimeFigureOut">
               <a:rPr lang="fr-FR" smtClean="0"/>
-              <a:t>30/08/2021</a:t>
+              <a:t>11/09/2021</a:t>
             </a:fld>
             <a:endParaRPr lang="fr-FR"/>
           </a:p>
@@ -3025,7 +3507,7 @@
           <a:p>
             <a:fld id="{2E0450E2-BB8E-48D1-94E1-E4F675E29F3B}" type="datetimeFigureOut">
               <a:rPr lang="fr-FR" smtClean="0"/>
-              <a:t>30/08/2021</a:t>
+              <a:t>11/09/2021</a:t>
             </a:fld>
             <a:endParaRPr lang="fr-FR"/>
           </a:p>
@@ -3338,7 +3820,7 @@
           <a:p>
             <a:fld id="{2E0450E2-BB8E-48D1-94E1-E4F675E29F3B}" type="datetimeFigureOut">
               <a:rPr lang="fr-FR" smtClean="0"/>
-              <a:t>30/08/2021</a:t>
+              <a:t>11/09/2021</a:t>
             </a:fld>
             <a:endParaRPr lang="fr-FR"/>
           </a:p>
@@ -3627,7 +4109,7 @@
           <a:p>
             <a:fld id="{2E0450E2-BB8E-48D1-94E1-E4F675E29F3B}" type="datetimeFigureOut">
               <a:rPr lang="fr-FR" smtClean="0"/>
-              <a:t>30/08/2021</a:t>
+              <a:t>11/09/2021</a:t>
             </a:fld>
             <a:endParaRPr lang="fr-FR"/>
           </a:p>
@@ -3872,7 +4354,7 @@
             <a:fld id="{2E0450E2-BB8E-48D1-94E1-E4F675E29F3B}" type="datetimeFigureOut">
               <a:rPr lang="fr-FR" smtClean="0"/>
               <a:pPr/>
-              <a:t>30/08/2021</a:t>
+              <a:t>11/09/2021</a:t>
             </a:fld>
             <a:endParaRPr lang="fr-FR"/>
           </a:p>
@@ -4444,8 +4926,8 @@
         </p:nvSpPr>
         <p:spPr>
           <a:xfrm>
-            <a:off x="277764" y="3783096"/>
-            <a:ext cx="7917991" cy="738664"/>
+            <a:off x="265042" y="3675374"/>
+            <a:ext cx="7917991" cy="954107"/>
           </a:xfrm>
           <a:prstGeom prst="rect">
             <a:avLst/>
@@ -4459,7 +4941,7 @@
           <a:lstStyle/>
           <a:p>
             <a:r>
-              <a:rPr lang="en-GB" sz="2100" b="1" cap="all" dirty="0">
+              <a:rPr lang="en-GB" sz="2800" b="1" cap="all" dirty="0">
                 <a:solidFill>
                   <a:srgbClr val="F9D45F"/>
                 </a:solidFill>
@@ -4468,7 +4950,7 @@
               <a:t>De </a:t>
             </a:r>
             <a:r>
-              <a:rPr lang="en-GB" sz="2100" b="1" cap="all" dirty="0" err="1">
+              <a:rPr lang="en-GB" sz="2800" b="1" cap="all" dirty="0" err="1">
                 <a:solidFill>
                   <a:srgbClr val="F9D45F"/>
                 </a:solidFill>
@@ -4477,7 +4959,7 @@
               <a:t>l’autre</a:t>
             </a:r>
             <a:r>
-              <a:rPr lang="en-GB" sz="2100" b="1" cap="all" dirty="0">
+              <a:rPr lang="en-GB" sz="2800" b="1" cap="all" dirty="0">
                 <a:solidFill>
                   <a:srgbClr val="F9D45F"/>
                 </a:solidFill>
@@ -4486,7 +4968,7 @@
               <a:t> </a:t>
             </a:r>
             <a:r>
-              <a:rPr lang="en-GB" sz="2100" b="1" cap="all" dirty="0" err="1">
+              <a:rPr lang="en-GB" sz="2800" b="1" cap="all" dirty="0" err="1">
                 <a:solidFill>
                   <a:srgbClr val="F9D45F"/>
                 </a:solidFill>
@@ -4495,7 +4977,7 @@
               <a:t>côté</a:t>
             </a:r>
             <a:r>
-              <a:rPr lang="en-GB" sz="2100" b="1" cap="all" dirty="0">
+              <a:rPr lang="en-GB" sz="2800" b="1" cap="all" dirty="0">
                 <a:solidFill>
                   <a:srgbClr val="F9D45F"/>
                 </a:solidFill>
@@ -4504,7 +4986,7 @@
               <a:t> du </a:t>
             </a:r>
             <a:r>
-              <a:rPr lang="en-GB" sz="2100" b="1" cap="all" dirty="0" err="1">
+              <a:rPr lang="en-GB" sz="2800" b="1" cap="all" dirty="0" err="1">
                 <a:solidFill>
                   <a:srgbClr val="F9D45F"/>
                 </a:solidFill>
@@ -4513,7 +4995,7 @@
               <a:t>miroir</a:t>
             </a:r>
             <a:br>
-              <a:rPr lang="en-GB" sz="2100" b="1" cap="all" dirty="0">
+              <a:rPr lang="en-GB" sz="2800" b="1" cap="all" dirty="0">
                 <a:solidFill>
                   <a:srgbClr val="F9D45F"/>
                 </a:solidFill>
@@ -4521,7 +5003,7 @@
               </a:rPr>
             </a:br>
             <a:r>
-              <a:rPr lang="en-GB" sz="2100" b="1" cap="all" dirty="0">
+              <a:rPr lang="en-GB" sz="2800" b="1" cap="all" dirty="0">
                 <a:solidFill>
                   <a:srgbClr val="FAFCD7"/>
                 </a:solidFill>
@@ -4530,7 +5012,7 @@
               <a:t>La </a:t>
             </a:r>
             <a:r>
-              <a:rPr lang="en-GB" sz="2100" b="1" cap="all" dirty="0" err="1">
+              <a:rPr lang="en-GB" sz="2800" b="1" cap="all" dirty="0" err="1">
                 <a:solidFill>
                   <a:srgbClr val="FAFCD7"/>
                 </a:solidFill>
@@ -4539,7 +5021,7 @@
               <a:t>fabrique</a:t>
             </a:r>
             <a:r>
-              <a:rPr lang="en-GB" sz="2100" b="1" cap="all" dirty="0">
+              <a:rPr lang="en-GB" sz="2800" b="1" cap="all" dirty="0">
                 <a:solidFill>
                   <a:srgbClr val="FAFCD7"/>
                 </a:solidFill>
@@ -4564,7 +5046,7 @@
         </p:nvGrpSpPr>
         <p:grpSpPr>
           <a:xfrm>
-            <a:off x="7711003" y="4005714"/>
+            <a:off x="7711003" y="4084722"/>
             <a:ext cx="4215955" cy="544759"/>
             <a:chOff x="6997673" y="4782195"/>
             <a:chExt cx="4215955" cy="544759"/>
@@ -4831,6 +5313,348 @@
 </p:sld>
 </file>
 
+<file path=ppt/slides/slide10.xml><?xml version="1.0" encoding="utf-8"?>
+<p:sld xmlns:a="http://schemas.openxmlformats.org/drawingml/2006/main" xmlns:r="http://schemas.openxmlformats.org/officeDocument/2006/relationships" xmlns:p="http://schemas.openxmlformats.org/presentationml/2006/main">
+  <p:cSld>
+    <p:bg>
+      <p:bgPr>
+        <a:solidFill>
+          <a:schemeClr val="tx1"/>
+        </a:solidFill>
+        <a:effectLst/>
+      </p:bgPr>
+    </p:bg>
+    <p:spTree>
+      <p:nvGrpSpPr>
+        <p:cNvPr id="1" name=""/>
+        <p:cNvGrpSpPr/>
+        <p:nvPr/>
+      </p:nvGrpSpPr>
+      <p:grpSpPr>
+        <a:xfrm>
+          <a:off x="0" y="0"/>
+          <a:ext cx="0" cy="0"/>
+          <a:chOff x="0" y="0"/>
+          <a:chExt cx="0" cy="0"/>
+        </a:xfrm>
+      </p:grpSpPr>
+      <p:pic>
+        <p:nvPicPr>
+          <p:cNvPr id="4" name="Picture 3">
+            <a:extLst>
+              <a:ext uri="{FF2B5EF4-FFF2-40B4-BE49-F238E27FC236}">
+                <a16:creationId xmlns:a16="http://schemas.microsoft.com/office/drawing/2014/main" id="{46630CD3-35B5-4ACF-8378-B32B177CF38C}"/>
+              </a:ext>
+            </a:extLst>
+          </p:cNvPr>
+          <p:cNvPicPr>
+            <a:picLocks noChangeAspect="1"/>
+          </p:cNvPicPr>
+          <p:nvPr/>
+        </p:nvPicPr>
+        <p:blipFill>
+          <a:blip r:embed="rId3">
+            <a:extLst>
+              <a:ext uri="{28A0092B-C50C-407E-A947-70E740481C1C}">
+                <a14:useLocalDpi xmlns:a14="http://schemas.microsoft.com/office/drawing/2010/main" val="0"/>
+              </a:ext>
+            </a:extLst>
+          </a:blip>
+          <a:stretch>
+            <a:fillRect/>
+          </a:stretch>
+        </p:blipFill>
+        <p:spPr>
+          <a:xfrm>
+            <a:off x="0" y="-1024854"/>
+            <a:ext cx="12664837" cy="7915523"/>
+          </a:xfrm>
+          <a:prstGeom prst="rect">
+            <a:avLst/>
+          </a:prstGeom>
+        </p:spPr>
+      </p:pic>
+      <p:sp>
+        <p:nvSpPr>
+          <p:cNvPr id="8" name="Rectangle 7">
+            <a:extLst>
+              <a:ext uri="{FF2B5EF4-FFF2-40B4-BE49-F238E27FC236}">
+                <a16:creationId xmlns:a16="http://schemas.microsoft.com/office/drawing/2014/main" id="{439E5792-2D17-4C17-8CB9-D10E6F6DB008}"/>
+              </a:ext>
+            </a:extLst>
+          </p:cNvPr>
+          <p:cNvSpPr/>
+          <p:nvPr/>
+        </p:nvSpPr>
+        <p:spPr>
+          <a:xfrm>
+            <a:off x="0" y="4848834"/>
+            <a:ext cx="12192000" cy="1276281"/>
+          </a:xfrm>
+          <a:prstGeom prst="rect">
+            <a:avLst/>
+          </a:prstGeom>
+          <a:solidFill>
+            <a:schemeClr val="tx1">
+              <a:alpha val="86000"/>
+            </a:schemeClr>
+          </a:solidFill>
+          <a:ln>
+            <a:noFill/>
+          </a:ln>
+        </p:spPr>
+        <p:style>
+          <a:lnRef idx="2">
+            <a:schemeClr val="accent1">
+              <a:shade val="50000"/>
+            </a:schemeClr>
+          </a:lnRef>
+          <a:fillRef idx="1">
+            <a:schemeClr val="accent1"/>
+          </a:fillRef>
+          <a:effectRef idx="0">
+            <a:schemeClr val="accent1"/>
+          </a:effectRef>
+          <a:fontRef idx="minor">
+            <a:schemeClr val="lt1"/>
+          </a:fontRef>
+        </p:style>
+        <p:txBody>
+          <a:bodyPr rtlCol="0" anchor="ctr"/>
+          <a:lstStyle/>
+          <a:p>
+            <a:pPr algn="ctr"/>
+            <a:endParaRPr lang="fr-FR" dirty="0"/>
+          </a:p>
+        </p:txBody>
+      </p:sp>
+      <p:sp>
+        <p:nvSpPr>
+          <p:cNvPr id="9" name="TextBox 8">
+            <a:extLst>
+              <a:ext uri="{FF2B5EF4-FFF2-40B4-BE49-F238E27FC236}">
+                <a16:creationId xmlns:a16="http://schemas.microsoft.com/office/drawing/2014/main" id="{5911AC05-C362-40C9-9776-27BCF68ACA39}"/>
+              </a:ext>
+            </a:extLst>
+          </p:cNvPr>
+          <p:cNvSpPr txBox="1"/>
+          <p:nvPr/>
+        </p:nvSpPr>
+        <p:spPr>
+          <a:xfrm>
+            <a:off x="498797" y="5225364"/>
+            <a:ext cx="6225914" cy="523220"/>
+          </a:xfrm>
+          <a:prstGeom prst="rect">
+            <a:avLst/>
+          </a:prstGeom>
+          <a:noFill/>
+        </p:spPr>
+        <p:txBody>
+          <a:bodyPr wrap="square" rtlCol="0" anchor="ctr">
+            <a:spAutoFit/>
+          </a:bodyPr>
+          <a:lstStyle/>
+          <a:p>
+            <a:r>
+              <a:rPr lang="fr-FR" sz="2800" b="1" cap="all" dirty="0">
+                <a:solidFill>
+                  <a:srgbClr val="F9D45F"/>
+                </a:solidFill>
+                <a:latin typeface="Alte Haas Grotesk" panose="02000503000000020004" pitchFamily="2" charset="0"/>
+              </a:rPr>
+              <a:t>De l’autre </a:t>
+            </a:r>
+            <a:r>
+              <a:rPr lang="fr-FR" sz="2800" b="1" cap="all" dirty="0">
+                <a:solidFill>
+                  <a:srgbClr val="FAFCD7"/>
+                </a:solidFill>
+                <a:latin typeface="Alte Haas Grotesk" panose="02000503000000020004" pitchFamily="2" charset="0"/>
+              </a:rPr>
+              <a:t>côté</a:t>
+            </a:r>
+          </a:p>
+        </p:txBody>
+      </p:sp>
+    </p:spTree>
+    <p:extLst>
+      <p:ext uri="{BB962C8B-B14F-4D97-AF65-F5344CB8AC3E}">
+        <p14:creationId xmlns:p14="http://schemas.microsoft.com/office/powerpoint/2010/main" val="1949853966"/>
+      </p:ext>
+    </p:extLst>
+  </p:cSld>
+  <p:clrMapOvr>
+    <a:masterClrMapping/>
+  </p:clrMapOvr>
+</p:sld>
+</file>
+
+<file path=ppt/slides/slide11.xml><?xml version="1.0" encoding="utf-8"?>
+<p:sld xmlns:a="http://schemas.openxmlformats.org/drawingml/2006/main" xmlns:r="http://schemas.openxmlformats.org/officeDocument/2006/relationships" xmlns:p="http://schemas.openxmlformats.org/presentationml/2006/main">
+  <p:cSld>
+    <p:spTree>
+      <p:nvGrpSpPr>
+        <p:cNvPr id="1" name=""/>
+        <p:cNvGrpSpPr/>
+        <p:nvPr/>
+      </p:nvGrpSpPr>
+      <p:grpSpPr>
+        <a:xfrm>
+          <a:off x="0" y="0"/>
+          <a:ext cx="0" cy="0"/>
+          <a:chOff x="0" y="0"/>
+          <a:chExt cx="0" cy="0"/>
+        </a:xfrm>
+      </p:grpSpPr>
+      <p:pic>
+        <p:nvPicPr>
+          <p:cNvPr id="7" name="Picture 6">
+            <a:extLst>
+              <a:ext uri="{FF2B5EF4-FFF2-40B4-BE49-F238E27FC236}">
+                <a16:creationId xmlns:a16="http://schemas.microsoft.com/office/drawing/2014/main" id="{49AB82E3-171E-4CA5-A6A3-7D76D145B732}"/>
+              </a:ext>
+            </a:extLst>
+          </p:cNvPr>
+          <p:cNvPicPr>
+            <a:picLocks noChangeAspect="1"/>
+          </p:cNvPicPr>
+          <p:nvPr/>
+        </p:nvPicPr>
+        <p:blipFill rotWithShape="1">
+          <a:blip r:embed="rId3">
+            <a:extLst>
+              <a:ext uri="{28A0092B-C50C-407E-A947-70E740481C1C}">
+                <a14:useLocalDpi xmlns:a14="http://schemas.microsoft.com/office/drawing/2010/main" val="0"/>
+              </a:ext>
+            </a:extLst>
+          </a:blip>
+          <a:srcRect l="2015" r="4651"/>
+          <a:stretch/>
+        </p:blipFill>
+        <p:spPr>
+          <a:xfrm>
+            <a:off x="0" y="0"/>
+            <a:ext cx="12192000" cy="6858000"/>
+          </a:xfrm>
+          <a:prstGeom prst="rect">
+            <a:avLst/>
+          </a:prstGeom>
+        </p:spPr>
+      </p:pic>
+      <p:sp>
+        <p:nvSpPr>
+          <p:cNvPr id="8" name="Rectangle 7">
+            <a:extLst>
+              <a:ext uri="{FF2B5EF4-FFF2-40B4-BE49-F238E27FC236}">
+                <a16:creationId xmlns:a16="http://schemas.microsoft.com/office/drawing/2014/main" id="{439E5792-2D17-4C17-8CB9-D10E6F6DB008}"/>
+              </a:ext>
+            </a:extLst>
+          </p:cNvPr>
+          <p:cNvSpPr/>
+          <p:nvPr/>
+        </p:nvSpPr>
+        <p:spPr>
+          <a:xfrm>
+            <a:off x="0" y="4848834"/>
+            <a:ext cx="12192000" cy="1276281"/>
+          </a:xfrm>
+          <a:prstGeom prst="rect">
+            <a:avLst/>
+          </a:prstGeom>
+          <a:solidFill>
+            <a:schemeClr val="tx1">
+              <a:alpha val="72000"/>
+            </a:schemeClr>
+          </a:solidFill>
+          <a:ln>
+            <a:noFill/>
+          </a:ln>
+        </p:spPr>
+        <p:style>
+          <a:lnRef idx="2">
+            <a:schemeClr val="accent1">
+              <a:shade val="50000"/>
+            </a:schemeClr>
+          </a:lnRef>
+          <a:fillRef idx="1">
+            <a:schemeClr val="accent1"/>
+          </a:fillRef>
+          <a:effectRef idx="0">
+            <a:schemeClr val="accent1"/>
+          </a:effectRef>
+          <a:fontRef idx="minor">
+            <a:schemeClr val="lt1"/>
+          </a:fontRef>
+        </p:style>
+        <p:txBody>
+          <a:bodyPr rtlCol="0" anchor="ctr"/>
+          <a:lstStyle/>
+          <a:p>
+            <a:pPr algn="ctr"/>
+            <a:endParaRPr lang="fr-FR"/>
+          </a:p>
+        </p:txBody>
+      </p:sp>
+      <p:sp>
+        <p:nvSpPr>
+          <p:cNvPr id="9" name="TextBox 8">
+            <a:extLst>
+              <a:ext uri="{FF2B5EF4-FFF2-40B4-BE49-F238E27FC236}">
+                <a16:creationId xmlns:a16="http://schemas.microsoft.com/office/drawing/2014/main" id="{5911AC05-C362-40C9-9776-27BCF68ACA39}"/>
+              </a:ext>
+            </a:extLst>
+          </p:cNvPr>
+          <p:cNvSpPr txBox="1"/>
+          <p:nvPr/>
+        </p:nvSpPr>
+        <p:spPr>
+          <a:xfrm>
+            <a:off x="498797" y="5225364"/>
+            <a:ext cx="6225914" cy="523220"/>
+          </a:xfrm>
+          <a:prstGeom prst="rect">
+            <a:avLst/>
+          </a:prstGeom>
+          <a:noFill/>
+        </p:spPr>
+        <p:txBody>
+          <a:bodyPr wrap="square" rtlCol="0" anchor="ctr">
+            <a:spAutoFit/>
+          </a:bodyPr>
+          <a:lstStyle/>
+          <a:p>
+            <a:r>
+              <a:rPr lang="fr-FR" sz="2800" b="1" cap="all" dirty="0">
+                <a:solidFill>
+                  <a:srgbClr val="F9D45F"/>
+                </a:solidFill>
+                <a:latin typeface="Alte Haas Grotesk" panose="02000503000000020004" pitchFamily="2" charset="0"/>
+              </a:rPr>
+              <a:t>Basics</a:t>
+            </a:r>
+            <a:endParaRPr lang="fr-FR" sz="2800" b="1" cap="all" dirty="0">
+              <a:solidFill>
+                <a:srgbClr val="FAFCD7"/>
+              </a:solidFill>
+              <a:latin typeface="Alte Haas Grotesk" panose="02000503000000020004" pitchFamily="2" charset="0"/>
+            </a:endParaRPr>
+          </a:p>
+        </p:txBody>
+      </p:sp>
+    </p:spTree>
+    <p:extLst>
+      <p:ext uri="{BB962C8B-B14F-4D97-AF65-F5344CB8AC3E}">
+        <p14:creationId xmlns:p14="http://schemas.microsoft.com/office/powerpoint/2010/main" val="2345522144"/>
+      </p:ext>
+    </p:extLst>
+  </p:cSld>
+  <p:clrMapOvr>
+    <a:masterClrMapping/>
+  </p:clrMapOvr>
+</p:sld>
+</file>
+
 <file path=ppt/slides/slide2.xml><?xml version="1.0" encoding="utf-8"?>
 <p:sld xmlns:a="http://schemas.openxmlformats.org/drawingml/2006/main" xmlns:r="http://schemas.openxmlformats.org/officeDocument/2006/relationships" xmlns:p="http://schemas.openxmlformats.org/presentationml/2006/main">
   <p:cSld>
@@ -5358,7 +6182,7 @@
                 </a:solidFill>
                 <a:latin typeface="Alte Haas Grotesk" panose="02000503000000020004" pitchFamily="2" charset="0"/>
               </a:rPr>
-              <a:t>Trop </a:t>
+              <a:t>C’est Trop long </a:t>
             </a:r>
             <a:r>
               <a:rPr lang="fr-FR" sz="2800" b="1" cap="all" dirty="0">
@@ -5367,7 +6191,7 @@
                 </a:solidFill>
                 <a:latin typeface="Alte Haas Grotesk" panose="02000503000000020004" pitchFamily="2" charset="0"/>
               </a:rPr>
-              <a:t>long…</a:t>
+              <a:t>P…</a:t>
             </a:r>
           </a:p>
         </p:txBody>
@@ -5456,10 +6280,10 @@
       </p:grpSpPr>
       <p:pic>
         <p:nvPicPr>
-          <p:cNvPr id="3" name="Picture 2">
-            <a:extLst>
-              <a:ext uri="{FF2B5EF4-FFF2-40B4-BE49-F238E27FC236}">
-                <a16:creationId xmlns:a16="http://schemas.microsoft.com/office/drawing/2014/main" id="{0B9579C0-1CE7-4129-8F18-4F0B268AD166}"/>
+          <p:cNvPr id="4" name="Picture 3">
+            <a:extLst>
+              <a:ext uri="{FF2B5EF4-FFF2-40B4-BE49-F238E27FC236}">
+                <a16:creationId xmlns:a16="http://schemas.microsoft.com/office/drawing/2014/main" id="{4D9220BB-6670-470B-8E8C-5F577F4A1828}"/>
               </a:ext>
             </a:extLst>
           </p:cNvPr>
@@ -5482,8 +6306,8 @@
         </p:blipFill>
         <p:spPr>
           <a:xfrm>
-            <a:off x="-30162" y="-883444"/>
-            <a:ext cx="12252325" cy="9189244"/>
+            <a:off x="1266908" y="209605"/>
+            <a:ext cx="9658184" cy="6438789"/>
           </a:xfrm>
           <a:prstGeom prst="rect">
             <a:avLst/>
@@ -5579,7 +6403,7 @@
                 </a:solidFill>
                 <a:latin typeface="Alte Haas Grotesk" panose="02000503000000020004" pitchFamily="2" charset="0"/>
               </a:rPr>
-              <a:t>Les </a:t>
+              <a:t>Trop </a:t>
             </a:r>
             <a:r>
               <a:rPr lang="fr-FR" sz="2800" b="1" cap="all" dirty="0">
@@ -5588,7 +6412,470 @@
                 </a:solidFill>
                 <a:latin typeface="Alte Haas Grotesk" panose="02000503000000020004" pitchFamily="2" charset="0"/>
               </a:rPr>
-              <a:t>Garagistes</a:t>
+              <a:t>tech-</a:t>
+            </a:r>
+            <a:r>
+              <a:rPr lang="fr-FR" sz="2800" b="1" cap="all" dirty="0" err="1">
+                <a:solidFill>
+                  <a:srgbClr val="FAFCD7"/>
+                </a:solidFill>
+                <a:latin typeface="Alte Haas Grotesk" panose="02000503000000020004" pitchFamily="2" charset="0"/>
+              </a:rPr>
+              <a:t>centric</a:t>
+            </a:r>
+            <a:endParaRPr lang="fr-FR" sz="2800" b="1" cap="all" dirty="0">
+              <a:solidFill>
+                <a:srgbClr val="F9D45F"/>
+              </a:solidFill>
+              <a:latin typeface="Alte Haas Grotesk" panose="02000503000000020004" pitchFamily="2" charset="0"/>
+            </a:endParaRPr>
+          </a:p>
+        </p:txBody>
+      </p:sp>
+    </p:spTree>
+    <p:extLst>
+      <p:ext uri="{BB962C8B-B14F-4D97-AF65-F5344CB8AC3E}">
+        <p14:creationId xmlns:p14="http://schemas.microsoft.com/office/powerpoint/2010/main" val="3628356016"/>
+      </p:ext>
+    </p:extLst>
+  </p:cSld>
+  <p:clrMapOvr>
+    <a:masterClrMapping/>
+  </p:clrMapOvr>
+</p:sld>
+</file>
+
+<file path=ppt/slides/slide5.xml><?xml version="1.0" encoding="utf-8"?>
+<p:sld xmlns:a="http://schemas.openxmlformats.org/drawingml/2006/main" xmlns:r="http://schemas.openxmlformats.org/officeDocument/2006/relationships" xmlns:p="http://schemas.openxmlformats.org/presentationml/2006/main">
+  <p:cSld>
+    <p:spTree>
+      <p:nvGrpSpPr>
+        <p:cNvPr id="1" name=""/>
+        <p:cNvGrpSpPr/>
+        <p:nvPr/>
+      </p:nvGrpSpPr>
+      <p:grpSpPr>
+        <a:xfrm>
+          <a:off x="0" y="0"/>
+          <a:ext cx="0" cy="0"/>
+          <a:chOff x="0" y="0"/>
+          <a:chExt cx="0" cy="0"/>
+        </a:xfrm>
+      </p:grpSpPr>
+      <p:pic>
+        <p:nvPicPr>
+          <p:cNvPr id="3" name="Picture 2">
+            <a:extLst>
+              <a:ext uri="{FF2B5EF4-FFF2-40B4-BE49-F238E27FC236}">
+                <a16:creationId xmlns:a16="http://schemas.microsoft.com/office/drawing/2014/main" id="{35928F27-B9A3-4BDE-9CA0-9D020FBAD415}"/>
+              </a:ext>
+            </a:extLst>
+          </p:cNvPr>
+          <p:cNvPicPr>
+            <a:picLocks noChangeAspect="1"/>
+          </p:cNvPicPr>
+          <p:nvPr/>
+        </p:nvPicPr>
+        <p:blipFill>
+          <a:blip r:embed="rId3">
+            <a:extLst>
+              <a:ext uri="{28A0092B-C50C-407E-A947-70E740481C1C}">
+                <a14:useLocalDpi xmlns:a14="http://schemas.microsoft.com/office/drawing/2010/main" val="0"/>
+              </a:ext>
+            </a:extLst>
+          </a:blip>
+          <a:stretch>
+            <a:fillRect/>
+          </a:stretch>
+        </p:blipFill>
+        <p:spPr>
+          <a:xfrm>
+            <a:off x="0" y="0"/>
+            <a:ext cx="13226086" cy="6943695"/>
+          </a:xfrm>
+          <a:prstGeom prst="rect">
+            <a:avLst/>
+          </a:prstGeom>
+        </p:spPr>
+      </p:pic>
+      <p:sp>
+        <p:nvSpPr>
+          <p:cNvPr id="8" name="Rectangle 7">
+            <a:extLst>
+              <a:ext uri="{FF2B5EF4-FFF2-40B4-BE49-F238E27FC236}">
+                <a16:creationId xmlns:a16="http://schemas.microsoft.com/office/drawing/2014/main" id="{439E5792-2D17-4C17-8CB9-D10E6F6DB008}"/>
+              </a:ext>
+            </a:extLst>
+          </p:cNvPr>
+          <p:cNvSpPr/>
+          <p:nvPr/>
+        </p:nvSpPr>
+        <p:spPr>
+          <a:xfrm>
+            <a:off x="0" y="4848834"/>
+            <a:ext cx="12192000" cy="1276281"/>
+          </a:xfrm>
+          <a:prstGeom prst="rect">
+            <a:avLst/>
+          </a:prstGeom>
+          <a:solidFill>
+            <a:schemeClr val="tx1">
+              <a:alpha val="86000"/>
+            </a:schemeClr>
+          </a:solidFill>
+          <a:ln>
+            <a:noFill/>
+          </a:ln>
+        </p:spPr>
+        <p:style>
+          <a:lnRef idx="2">
+            <a:schemeClr val="accent1">
+              <a:shade val="50000"/>
+            </a:schemeClr>
+          </a:lnRef>
+          <a:fillRef idx="1">
+            <a:schemeClr val="accent1"/>
+          </a:fillRef>
+          <a:effectRef idx="0">
+            <a:schemeClr val="accent1"/>
+          </a:effectRef>
+          <a:fontRef idx="minor">
+            <a:schemeClr val="lt1"/>
+          </a:fontRef>
+        </p:style>
+        <p:txBody>
+          <a:bodyPr rtlCol="0" anchor="ctr"/>
+          <a:lstStyle/>
+          <a:p>
+            <a:pPr algn="ctr"/>
+            <a:endParaRPr lang="fr-FR"/>
+          </a:p>
+        </p:txBody>
+      </p:sp>
+      <p:sp>
+        <p:nvSpPr>
+          <p:cNvPr id="9" name="TextBox 8">
+            <a:extLst>
+              <a:ext uri="{FF2B5EF4-FFF2-40B4-BE49-F238E27FC236}">
+                <a16:creationId xmlns:a16="http://schemas.microsoft.com/office/drawing/2014/main" id="{5911AC05-C362-40C9-9776-27BCF68ACA39}"/>
+              </a:ext>
+            </a:extLst>
+          </p:cNvPr>
+          <p:cNvSpPr txBox="1"/>
+          <p:nvPr/>
+        </p:nvSpPr>
+        <p:spPr>
+          <a:xfrm>
+            <a:off x="498797" y="5225364"/>
+            <a:ext cx="6225914" cy="523220"/>
+          </a:xfrm>
+          <a:prstGeom prst="rect">
+            <a:avLst/>
+          </a:prstGeom>
+          <a:noFill/>
+        </p:spPr>
+        <p:txBody>
+          <a:bodyPr wrap="square" rtlCol="0" anchor="ctr">
+            <a:spAutoFit/>
+          </a:bodyPr>
+          <a:lstStyle/>
+          <a:p>
+            <a:r>
+              <a:rPr lang="fr-FR" sz="2800" b="1" cap="all" dirty="0">
+                <a:solidFill>
+                  <a:srgbClr val="F9D45F"/>
+                </a:solidFill>
+                <a:latin typeface="Alte Haas Grotesk" panose="02000503000000020004" pitchFamily="2" charset="0"/>
+              </a:rPr>
+              <a:t>Trop </a:t>
+            </a:r>
+            <a:r>
+              <a:rPr lang="fr-FR" sz="2800" b="1" cap="all" dirty="0">
+                <a:solidFill>
+                  <a:srgbClr val="FAFCD7"/>
+                </a:solidFill>
+                <a:latin typeface="Alte Haas Grotesk" panose="02000503000000020004" pitchFamily="2" charset="0"/>
+              </a:rPr>
+              <a:t>rigides</a:t>
+            </a:r>
+            <a:endParaRPr lang="fr-FR" sz="2800" b="1" cap="all" dirty="0">
+              <a:solidFill>
+                <a:srgbClr val="F9D45F"/>
+              </a:solidFill>
+              <a:latin typeface="Alte Haas Grotesk" panose="02000503000000020004" pitchFamily="2" charset="0"/>
+            </a:endParaRPr>
+          </a:p>
+        </p:txBody>
+      </p:sp>
+      <p:sp>
+        <p:nvSpPr>
+          <p:cNvPr id="5" name="TextBox 4">
+            <a:extLst>
+              <a:ext uri="{FF2B5EF4-FFF2-40B4-BE49-F238E27FC236}">
+                <a16:creationId xmlns:a16="http://schemas.microsoft.com/office/drawing/2014/main" id="{267AC933-31BA-48A2-9B51-42B5157CF7BE}"/>
+              </a:ext>
+            </a:extLst>
+          </p:cNvPr>
+          <p:cNvSpPr txBox="1"/>
+          <p:nvPr/>
+        </p:nvSpPr>
+        <p:spPr>
+          <a:xfrm rot="21300000">
+            <a:off x="10567283" y="2115047"/>
+            <a:ext cx="1261884" cy="1015663"/>
+          </a:xfrm>
+          <a:prstGeom prst="rect">
+            <a:avLst/>
+          </a:prstGeom>
+          <a:noFill/>
+        </p:spPr>
+        <p:txBody>
+          <a:bodyPr wrap="none" rtlCol="0">
+            <a:spAutoFit/>
+          </a:bodyPr>
+          <a:lstStyle/>
+          <a:p>
+            <a:r>
+              <a:rPr lang="fr-FR" sz="2000" b="1" dirty="0" err="1">
+                <a:solidFill>
+                  <a:schemeClr val="bg1"/>
+                </a:solidFill>
+                <a:latin typeface="Courier New" panose="02070309020205020404" pitchFamily="49" charset="0"/>
+                <a:cs typeface="Courier New" panose="02070309020205020404" pitchFamily="49" charset="0"/>
+              </a:rPr>
+              <a:t>Given</a:t>
+            </a:r>
+            <a:r>
+              <a:rPr lang="fr-FR" sz="2000" b="1" dirty="0">
+                <a:solidFill>
+                  <a:schemeClr val="bg1"/>
+                </a:solidFill>
+                <a:latin typeface="Courier New" panose="02070309020205020404" pitchFamily="49" charset="0"/>
+                <a:cs typeface="Courier New" panose="02070309020205020404" pitchFamily="49" charset="0"/>
+              </a:rPr>
+              <a:t> …</a:t>
+            </a:r>
+          </a:p>
+          <a:p>
+            <a:r>
+              <a:rPr lang="fr-FR" sz="2000" b="1" dirty="0" err="1">
+                <a:solidFill>
+                  <a:schemeClr val="bg1"/>
+                </a:solidFill>
+                <a:latin typeface="Courier New" panose="02070309020205020404" pitchFamily="49" charset="0"/>
+                <a:cs typeface="Courier New" panose="02070309020205020404" pitchFamily="49" charset="0"/>
+              </a:rPr>
+              <a:t>When</a:t>
+            </a:r>
+            <a:r>
+              <a:rPr lang="fr-FR" sz="2000" b="1" dirty="0">
+                <a:solidFill>
+                  <a:schemeClr val="bg1"/>
+                </a:solidFill>
+                <a:latin typeface="Courier New" panose="02070309020205020404" pitchFamily="49" charset="0"/>
+                <a:cs typeface="Courier New" panose="02070309020205020404" pitchFamily="49" charset="0"/>
+              </a:rPr>
+              <a:t> …</a:t>
+            </a:r>
+          </a:p>
+          <a:p>
+            <a:r>
+              <a:rPr lang="fr-FR" sz="2000" b="1" dirty="0" err="1">
+                <a:solidFill>
+                  <a:schemeClr val="bg1"/>
+                </a:solidFill>
+                <a:latin typeface="Courier New" panose="02070309020205020404" pitchFamily="49" charset="0"/>
+                <a:cs typeface="Courier New" panose="02070309020205020404" pitchFamily="49" charset="0"/>
+              </a:rPr>
+              <a:t>Then</a:t>
+            </a:r>
+            <a:r>
+              <a:rPr lang="fr-FR" sz="2000" b="1" dirty="0">
+                <a:solidFill>
+                  <a:schemeClr val="bg1"/>
+                </a:solidFill>
+                <a:latin typeface="Courier New" panose="02070309020205020404" pitchFamily="49" charset="0"/>
+                <a:cs typeface="Courier New" panose="02070309020205020404" pitchFamily="49" charset="0"/>
+              </a:rPr>
+              <a:t> …</a:t>
+            </a:r>
+          </a:p>
+        </p:txBody>
+      </p:sp>
+    </p:spTree>
+    <p:extLst>
+      <p:ext uri="{BB962C8B-B14F-4D97-AF65-F5344CB8AC3E}">
+        <p14:creationId xmlns:p14="http://schemas.microsoft.com/office/powerpoint/2010/main" val="288967845"/>
+      </p:ext>
+    </p:extLst>
+  </p:cSld>
+  <p:clrMapOvr>
+    <a:masterClrMapping/>
+  </p:clrMapOvr>
+</p:sld>
+</file>
+
+<file path=ppt/slides/slide6.xml><?xml version="1.0" encoding="utf-8"?>
+<p:sld xmlns:a="http://schemas.openxmlformats.org/drawingml/2006/main" xmlns:r="http://schemas.openxmlformats.org/officeDocument/2006/relationships" xmlns:p="http://schemas.openxmlformats.org/presentationml/2006/main">
+  <p:cSld>
+    <p:spTree>
+      <p:nvGrpSpPr>
+        <p:cNvPr id="1" name=""/>
+        <p:cNvGrpSpPr/>
+        <p:nvPr/>
+      </p:nvGrpSpPr>
+      <p:grpSpPr>
+        <a:xfrm>
+          <a:off x="0" y="0"/>
+          <a:ext cx="0" cy="0"/>
+          <a:chOff x="0" y="0"/>
+          <a:chExt cx="0" cy="0"/>
+        </a:xfrm>
+      </p:grpSpPr>
+      <p:pic>
+        <p:nvPicPr>
+          <p:cNvPr id="3" name="Picture 2">
+            <a:extLst>
+              <a:ext uri="{FF2B5EF4-FFF2-40B4-BE49-F238E27FC236}">
+                <a16:creationId xmlns:a16="http://schemas.microsoft.com/office/drawing/2014/main" id="{0B9579C0-1CE7-4129-8F18-4F0B268AD166}"/>
+              </a:ext>
+            </a:extLst>
+          </p:cNvPr>
+          <p:cNvPicPr>
+            <a:picLocks noChangeAspect="1"/>
+          </p:cNvPicPr>
+          <p:nvPr/>
+        </p:nvPicPr>
+        <p:blipFill>
+          <a:blip r:embed="rId3">
+            <a:extLst>
+              <a:ext uri="{28A0092B-C50C-407E-A947-70E740481C1C}">
+                <a14:useLocalDpi xmlns:a14="http://schemas.microsoft.com/office/drawing/2010/main" val="0"/>
+              </a:ext>
+            </a:extLst>
+          </a:blip>
+          <a:stretch>
+            <a:fillRect/>
+          </a:stretch>
+        </p:blipFill>
+        <p:spPr>
+          <a:xfrm>
+            <a:off x="-30162" y="-883444"/>
+            <a:ext cx="12252325" cy="9189244"/>
+          </a:xfrm>
+          <a:prstGeom prst="rect">
+            <a:avLst/>
+          </a:prstGeom>
+        </p:spPr>
+      </p:pic>
+      <p:sp>
+        <p:nvSpPr>
+          <p:cNvPr id="8" name="Rectangle 7">
+            <a:extLst>
+              <a:ext uri="{FF2B5EF4-FFF2-40B4-BE49-F238E27FC236}">
+                <a16:creationId xmlns:a16="http://schemas.microsoft.com/office/drawing/2014/main" id="{439E5792-2D17-4C17-8CB9-D10E6F6DB008}"/>
+              </a:ext>
+            </a:extLst>
+          </p:cNvPr>
+          <p:cNvSpPr/>
+          <p:nvPr/>
+        </p:nvSpPr>
+        <p:spPr>
+          <a:xfrm>
+            <a:off x="0" y="4848834"/>
+            <a:ext cx="12192000" cy="1276281"/>
+          </a:xfrm>
+          <a:prstGeom prst="rect">
+            <a:avLst/>
+          </a:prstGeom>
+          <a:solidFill>
+            <a:schemeClr val="tx1">
+              <a:alpha val="86000"/>
+            </a:schemeClr>
+          </a:solidFill>
+          <a:ln>
+            <a:noFill/>
+          </a:ln>
+        </p:spPr>
+        <p:style>
+          <a:lnRef idx="2">
+            <a:schemeClr val="accent1">
+              <a:shade val="50000"/>
+            </a:schemeClr>
+          </a:lnRef>
+          <a:fillRef idx="1">
+            <a:schemeClr val="accent1"/>
+          </a:fillRef>
+          <a:effectRef idx="0">
+            <a:schemeClr val="accent1"/>
+          </a:effectRef>
+          <a:fontRef idx="minor">
+            <a:schemeClr val="lt1"/>
+          </a:fontRef>
+        </p:style>
+        <p:txBody>
+          <a:bodyPr rtlCol="0" anchor="ctr"/>
+          <a:lstStyle/>
+          <a:p>
+            <a:pPr algn="ctr"/>
+            <a:endParaRPr lang="fr-FR"/>
+          </a:p>
+        </p:txBody>
+      </p:sp>
+      <p:sp>
+        <p:nvSpPr>
+          <p:cNvPr id="9" name="TextBox 8">
+            <a:extLst>
+              <a:ext uri="{FF2B5EF4-FFF2-40B4-BE49-F238E27FC236}">
+                <a16:creationId xmlns:a16="http://schemas.microsoft.com/office/drawing/2014/main" id="{5911AC05-C362-40C9-9776-27BCF68ACA39}"/>
+              </a:ext>
+            </a:extLst>
+          </p:cNvPr>
+          <p:cNvSpPr txBox="1"/>
+          <p:nvPr/>
+        </p:nvSpPr>
+        <p:spPr>
+          <a:xfrm>
+            <a:off x="498797" y="5225364"/>
+            <a:ext cx="6225914" cy="523220"/>
+          </a:xfrm>
+          <a:prstGeom prst="rect">
+            <a:avLst/>
+          </a:prstGeom>
+          <a:noFill/>
+        </p:spPr>
+        <p:txBody>
+          <a:bodyPr wrap="square" rtlCol="0" anchor="ctr">
+            <a:spAutoFit/>
+          </a:bodyPr>
+          <a:lstStyle/>
+          <a:p>
+            <a:r>
+              <a:rPr lang="fr-FR" sz="2800" b="1" cap="all" dirty="0">
+                <a:solidFill>
+                  <a:srgbClr val="F9D45F"/>
+                </a:solidFill>
+                <a:latin typeface="Alte Haas Grotesk" panose="02000503000000020004" pitchFamily="2" charset="0"/>
+              </a:rPr>
+              <a:t>Les « </a:t>
+            </a:r>
+            <a:r>
+              <a:rPr lang="fr-FR" sz="2800" b="1" cap="all" dirty="0">
+                <a:solidFill>
+                  <a:srgbClr val="FAFCD7"/>
+                </a:solidFill>
+                <a:latin typeface="Alte Haas Grotesk" panose="02000503000000020004" pitchFamily="2" charset="0"/>
+              </a:rPr>
+              <a:t>Garagistes </a:t>
+            </a:r>
+            <a:r>
+              <a:rPr lang="fr-FR" sz="2800" b="1" cap="all" dirty="0">
+                <a:solidFill>
+                  <a:srgbClr val="F9D45F"/>
+                </a:solidFill>
+                <a:latin typeface="Alte Haas Grotesk" panose="02000503000000020004" pitchFamily="2" charset="0"/>
+              </a:rPr>
+              <a:t>»</a:t>
             </a:r>
           </a:p>
         </p:txBody>
@@ -5606,7 +6893,7 @@
 </p:sld>
 </file>
 
-<file path=ppt/slides/slide5.xml><?xml version="1.0" encoding="utf-8"?>
+<file path=ppt/slides/slide7.xml><?xml version="1.0" encoding="utf-8"?>
 <p:sld xmlns:a="http://schemas.openxmlformats.org/drawingml/2006/main" xmlns:r="http://schemas.openxmlformats.org/officeDocument/2006/relationships" xmlns:p="http://schemas.openxmlformats.org/presentationml/2006/main">
   <p:cSld>
     <p:spTree>
@@ -5793,7 +7080,7 @@
 </p:sld>
 </file>
 
-<file path=ppt/slides/slide6.xml><?xml version="1.0" encoding="utf-8"?>
+<file path=ppt/slides/slide8.xml><?xml version="1.0" encoding="utf-8"?>
 <p:sld xmlns:a="http://schemas.openxmlformats.org/drawingml/2006/main" xmlns:r="http://schemas.openxmlformats.org/officeDocument/2006/relationships" xmlns:p="http://schemas.openxmlformats.org/presentationml/2006/main">
   <p:cSld>
     <p:spTree>
@@ -5812,10 +7099,10 @@
       </p:grpSpPr>
       <p:pic>
         <p:nvPicPr>
-          <p:cNvPr id="7" name="Picture 6">
-            <a:extLst>
-              <a:ext uri="{FF2B5EF4-FFF2-40B4-BE49-F238E27FC236}">
-                <a16:creationId xmlns:a16="http://schemas.microsoft.com/office/drawing/2014/main" id="{49AB82E3-171E-4CA5-A6A3-7D76D145B732}"/>
+          <p:cNvPr id="3" name="Picture 2">
+            <a:extLst>
+              <a:ext uri="{FF2B5EF4-FFF2-40B4-BE49-F238E27FC236}">
+                <a16:creationId xmlns:a16="http://schemas.microsoft.com/office/drawing/2014/main" id="{ED4562C0-EA09-4CBF-B779-E331B58AAF3E}"/>
               </a:ext>
             </a:extLst>
           </p:cNvPr>
@@ -5824,7 +7111,7 @@
           </p:cNvPicPr>
           <p:nvPr/>
         </p:nvPicPr>
-        <p:blipFill rotWithShape="1">
+        <p:blipFill>
           <a:blip r:embed="rId3">
             <a:extLst>
               <a:ext uri="{28A0092B-C50C-407E-A947-70E740481C1C}">
@@ -5832,13 +7119,14 @@
               </a:ext>
             </a:extLst>
           </a:blip>
-          <a:srcRect l="2015" r="4651"/>
-          <a:stretch/>
+          <a:stretch>
+            <a:fillRect/>
+          </a:stretch>
         </p:blipFill>
         <p:spPr>
           <a:xfrm>
-            <a:off x="0" y="0"/>
-            <a:ext cx="12192000" cy="6858000"/>
+            <a:off x="0" y="201917"/>
+            <a:ext cx="13954897" cy="6656083"/>
           </a:xfrm>
           <a:prstGeom prst="rect">
             <a:avLst/>
@@ -5859,7 +7147,7 @@
         </p:nvSpPr>
         <p:spPr>
           <a:xfrm>
-            <a:off x="0" y="4848834"/>
+            <a:off x="0" y="4829784"/>
             <a:ext cx="12192000" cy="1276281"/>
           </a:xfrm>
           <a:prstGeom prst="rect">
@@ -5867,7 +7155,7 @@
           </a:prstGeom>
           <a:solidFill>
             <a:schemeClr val="tx1">
-              <a:alpha val="72000"/>
+              <a:alpha val="86000"/>
             </a:schemeClr>
           </a:solidFill>
           <a:ln>
@@ -5913,6 +7201,183 @@
         </p:nvSpPr>
         <p:spPr>
           <a:xfrm>
+            <a:off x="498796" y="5225364"/>
+            <a:ext cx="9353658" cy="523220"/>
+          </a:xfrm>
+          <a:prstGeom prst="rect">
+            <a:avLst/>
+          </a:prstGeom>
+          <a:noFill/>
+        </p:spPr>
+        <p:txBody>
+          <a:bodyPr wrap="square" rtlCol="0" anchor="ctr">
+            <a:spAutoFit/>
+          </a:bodyPr>
+          <a:lstStyle/>
+          <a:p>
+            <a:r>
+              <a:rPr lang="fr-FR" sz="2800" b="1" cap="all" dirty="0">
+                <a:solidFill>
+                  <a:srgbClr val="F9D45F"/>
+                </a:solidFill>
+                <a:latin typeface="Alte Haas Grotesk" panose="02000503000000020004" pitchFamily="2" charset="0"/>
+              </a:rPr>
+              <a:t>Relations </a:t>
+            </a:r>
+            <a:r>
+              <a:rPr lang="fr-FR" sz="2800" b="1" cap="all" dirty="0">
+                <a:solidFill>
+                  <a:srgbClr val="FAFCD7"/>
+                </a:solidFill>
+                <a:latin typeface="Alte Haas Grotesk" panose="02000503000000020004" pitchFamily="2" charset="0"/>
+              </a:rPr>
+              <a:t>entre équipes de dev</a:t>
+            </a:r>
+          </a:p>
+        </p:txBody>
+      </p:sp>
+    </p:spTree>
+    <p:extLst>
+      <p:ext uri="{BB962C8B-B14F-4D97-AF65-F5344CB8AC3E}">
+        <p14:creationId xmlns:p14="http://schemas.microsoft.com/office/powerpoint/2010/main" val="1701706574"/>
+      </p:ext>
+    </p:extLst>
+  </p:cSld>
+  <p:clrMapOvr>
+    <a:masterClrMapping/>
+  </p:clrMapOvr>
+</p:sld>
+</file>
+
+<file path=ppt/slides/slide9.xml><?xml version="1.0" encoding="utf-8"?>
+<p:sld xmlns:a="http://schemas.openxmlformats.org/drawingml/2006/main" xmlns:r="http://schemas.openxmlformats.org/officeDocument/2006/relationships" xmlns:p="http://schemas.openxmlformats.org/presentationml/2006/main">
+  <p:cSld>
+    <p:bg>
+      <p:bgPr>
+        <a:solidFill>
+          <a:schemeClr val="tx1"/>
+        </a:solidFill>
+        <a:effectLst/>
+      </p:bgPr>
+    </p:bg>
+    <p:spTree>
+      <p:nvGrpSpPr>
+        <p:cNvPr id="1" name=""/>
+        <p:cNvGrpSpPr/>
+        <p:nvPr/>
+      </p:nvGrpSpPr>
+      <p:grpSpPr>
+        <a:xfrm>
+          <a:off x="0" y="0"/>
+          <a:ext cx="0" cy="0"/>
+          <a:chOff x="0" y="0"/>
+          <a:chExt cx="0" cy="0"/>
+        </a:xfrm>
+      </p:grpSpPr>
+      <p:pic>
+        <p:nvPicPr>
+          <p:cNvPr id="3" name="Picture 2">
+            <a:extLst>
+              <a:ext uri="{FF2B5EF4-FFF2-40B4-BE49-F238E27FC236}">
+                <a16:creationId xmlns:a16="http://schemas.microsoft.com/office/drawing/2014/main" id="{0AE73D8B-583A-4DFE-A01E-5FE4BE761A83}"/>
+              </a:ext>
+            </a:extLst>
+          </p:cNvPr>
+          <p:cNvPicPr>
+            <a:picLocks noChangeAspect="1"/>
+          </p:cNvPicPr>
+          <p:nvPr/>
+        </p:nvPicPr>
+        <p:blipFill>
+          <a:blip r:embed="rId3">
+            <a:extLst>
+              <a:ext uri="{28A0092B-C50C-407E-A947-70E740481C1C}">
+                <a14:useLocalDpi xmlns:a14="http://schemas.microsoft.com/office/drawing/2010/main" val="0"/>
+              </a:ext>
+            </a:extLst>
+          </a:blip>
+          <a:stretch>
+            <a:fillRect/>
+          </a:stretch>
+        </p:blipFill>
+        <p:spPr>
+          <a:xfrm>
+            <a:off x="0" y="228600"/>
+            <a:ext cx="12192000" cy="6400800"/>
+          </a:xfrm>
+          <a:prstGeom prst="rect">
+            <a:avLst/>
+          </a:prstGeom>
+        </p:spPr>
+      </p:pic>
+      <p:sp>
+        <p:nvSpPr>
+          <p:cNvPr id="8" name="Rectangle 7">
+            <a:extLst>
+              <a:ext uri="{FF2B5EF4-FFF2-40B4-BE49-F238E27FC236}">
+                <a16:creationId xmlns:a16="http://schemas.microsoft.com/office/drawing/2014/main" id="{439E5792-2D17-4C17-8CB9-D10E6F6DB008}"/>
+              </a:ext>
+            </a:extLst>
+          </p:cNvPr>
+          <p:cNvSpPr/>
+          <p:nvPr/>
+        </p:nvSpPr>
+        <p:spPr>
+          <a:xfrm>
+            <a:off x="0" y="4848834"/>
+            <a:ext cx="12192000" cy="1276281"/>
+          </a:xfrm>
+          <a:prstGeom prst="rect">
+            <a:avLst/>
+          </a:prstGeom>
+          <a:solidFill>
+            <a:schemeClr val="tx1">
+              <a:alpha val="86000"/>
+            </a:schemeClr>
+          </a:solidFill>
+          <a:ln>
+            <a:noFill/>
+          </a:ln>
+        </p:spPr>
+        <p:style>
+          <a:lnRef idx="2">
+            <a:schemeClr val="accent1">
+              <a:shade val="50000"/>
+            </a:schemeClr>
+          </a:lnRef>
+          <a:fillRef idx="1">
+            <a:schemeClr val="accent1"/>
+          </a:fillRef>
+          <a:effectRef idx="0">
+            <a:schemeClr val="accent1"/>
+          </a:effectRef>
+          <a:fontRef idx="minor">
+            <a:schemeClr val="lt1"/>
+          </a:fontRef>
+        </p:style>
+        <p:txBody>
+          <a:bodyPr rtlCol="0" anchor="ctr"/>
+          <a:lstStyle/>
+          <a:p>
+            <a:pPr algn="ctr"/>
+            <a:endParaRPr lang="fr-FR"/>
+          </a:p>
+        </p:txBody>
+      </p:sp>
+      <p:sp>
+        <p:nvSpPr>
+          <p:cNvPr id="9" name="TextBox 8">
+            <a:extLst>
+              <a:ext uri="{FF2B5EF4-FFF2-40B4-BE49-F238E27FC236}">
+                <a16:creationId xmlns:a16="http://schemas.microsoft.com/office/drawing/2014/main" id="{5911AC05-C362-40C9-9776-27BCF68ACA39}"/>
+              </a:ext>
+            </a:extLst>
+          </p:cNvPr>
+          <p:cNvSpPr txBox="1"/>
+          <p:nvPr/>
+        </p:nvSpPr>
+        <p:spPr>
+          <a:xfrm>
             <a:off x="498797" y="5225364"/>
             <a:ext cx="6225914" cy="523220"/>
           </a:xfrm>
@@ -5934,21 +7399,24 @@
                 </a:solidFill>
                 <a:latin typeface="Alte Haas Grotesk" panose="02000503000000020004" pitchFamily="2" charset="0"/>
               </a:rPr>
-              <a:t>Basics</a:t>
-            </a:r>
-            <a:endParaRPr lang="fr-FR" sz="2800" b="1" cap="all" dirty="0">
-              <a:solidFill>
-                <a:srgbClr val="FAFCD7"/>
-              </a:solidFill>
-              <a:latin typeface="Alte Haas Grotesk" panose="02000503000000020004" pitchFamily="2" charset="0"/>
-            </a:endParaRPr>
+              <a:t>C’est Trop </a:t>
+            </a:r>
+            <a:r>
+              <a:rPr lang="fr-FR" sz="2800" b="1" cap="all" dirty="0">
+                <a:solidFill>
+                  <a:srgbClr val="FAFCD7"/>
+                </a:solidFill>
+                <a:latin typeface="Alte Haas Grotesk" panose="02000503000000020004" pitchFamily="2" charset="0"/>
+              </a:rPr>
+              <a:t>…</a:t>
+            </a:r>
           </a:p>
         </p:txBody>
       </p:sp>
     </p:spTree>
     <p:extLst>
       <p:ext uri="{BB962C8B-B14F-4D97-AF65-F5344CB8AC3E}">
-        <p14:creationId xmlns:p14="http://schemas.microsoft.com/office/powerpoint/2010/main" val="2345522144"/>
+        <p14:creationId xmlns:p14="http://schemas.microsoft.com/office/powerpoint/2010/main" val="3176465983"/>
       </p:ext>
     </p:extLst>
   </p:cSld>

</xml_diff>

<commit_message>
Add more slides and comments
</commit_message>
<xml_diff>
--- a/DeLAutreCoteDuMiroir.pptx
+++ b/DeLAutreCoteDuMiroir.pptx
@@ -5,7 +5,7 @@
     <p:sldMasterId id="2147483648" r:id="rId1"/>
   </p:sldMasterIdLst>
   <p:notesMasterIdLst>
-    <p:notesMasterId r:id="rId13"/>
+    <p:notesMasterId r:id="rId16"/>
   </p:notesMasterIdLst>
   <p:sldIdLst>
     <p:sldId id="256" r:id="rId2"/>
@@ -15,10 +15,13 @@
     <p:sldId id="267" r:id="rId6"/>
     <p:sldId id="264" r:id="rId7"/>
     <p:sldId id="263" r:id="rId8"/>
-    <p:sldId id="269" r:id="rId9"/>
-    <p:sldId id="265" r:id="rId10"/>
-    <p:sldId id="268" r:id="rId11"/>
-    <p:sldId id="262" r:id="rId12"/>
+    <p:sldId id="272" r:id="rId9"/>
+    <p:sldId id="271" r:id="rId10"/>
+    <p:sldId id="269" r:id="rId11"/>
+    <p:sldId id="268" r:id="rId12"/>
+    <p:sldId id="265" r:id="rId13"/>
+    <p:sldId id="270" r:id="rId14"/>
+    <p:sldId id="262" r:id="rId15"/>
   </p:sldIdLst>
   <p:sldSz cx="12192000" cy="6858000"/>
   <p:notesSz cx="6858000" cy="9144000"/>
@@ -207,7 +210,7 @@
           <a:p>
             <a:fld id="{83BBAB19-0C91-4298-A871-C5B9360137CE}" type="datetimeFigureOut">
               <a:rPr lang="fr-FR" smtClean="0"/>
-              <a:t>11/09/2021</a:t>
+              <a:t>12/09/2021</a:t>
             </a:fld>
             <a:endParaRPr lang="fr-FR"/>
           </a:p>
@@ -529,7 +532,7 @@
             </a:r>
             <a:r>
               <a:rPr lang="fr-FR" dirty="0"/>
-              <a:t> pour leur invitation : je suis super content d’être avec vous ce matin pour ce qui sera surement l’un de mes derniers talk (silence) d’ici un bon bout de temps. En effet, je suis sur le point d’arrêter mon activité de conseil (que je faisais avec beaucoup de plaisir depuis 6 ans environ) pour rejoindre </a:t>
+              <a:t> pour leur invitation : je suis super content d’être avec vous ce matin pour ce qui sera surement l’un de mes derniers talk (silence) avant un bon bout de temps. En effet, je suis sur le point d’arrêter mon activité de conseil (que je faisais avec beaucoup de plaisir depuis 6 ans environ) pour rejoindre </a:t>
             </a:r>
             <a:r>
               <a:rPr lang="fr-FR" dirty="0" err="1"/>
@@ -546,7 +549,7 @@
           <a:p>
             <a:r>
               <a:rPr lang="fr-FR" dirty="0"/>
-              <a:t>Et du coup ce talk -et cette conférence- tombent bien. En effet, un de mes rôles sera de faire en sorte que la relation entre les équipes Produits et les équipes IT soit efficace. </a:t>
+              <a:t>Et du coup ce talk -et cette conférence- tombent bien parce que l’un de mes rôles sera de faire en sorte que la relation entre les équipes Produits et les équipes IT soit efficace.</a:t>
             </a:r>
           </a:p>
           <a:p>
@@ -589,7 +592,7 @@
           <a:p>
             <a:r>
               <a:rPr lang="fr-FR" dirty="0"/>
-              <a:t>Je vous préviens, je vais sans doute aborder quelques sujets difficiles, tabous peut-être même pour certains. Mais l’objectif dans tout ça, sera </a:t>
+              <a:t>Alors je vous préviens, je vais sans doute aborder quelques sujets difficiles, tabous peut-être même pour certains. Mais l’objectif dans tout ça, sera </a:t>
             </a:r>
             <a:r>
               <a:rPr lang="fr-FR" b="1" dirty="0"/>
@@ -597,7 +600,13 @@
             </a:r>
             <a:r>
               <a:rPr lang="fr-FR" dirty="0"/>
-              <a:t> de partager avec vous des choses ou des techniques que j’ai eu la chance de pouvoir expérimenter avec succès avec la plupart de mes clients et équipes de DEV. </a:t>
+              <a:t> de partager avec vous des choses ou des techniques que j’ai eu la chance de pouvoir expérimenter avec la plupart de mes clients et équipes de DEV. </a:t>
+            </a:r>
+          </a:p>
+          <a:p>
+            <a:r>
+              <a:rPr lang="fr-FR" dirty="0"/>
+              <a:t>Ok, ça vous va comme programme ? Vous êtes chauds ? Ok.</a:t>
             </a:r>
           </a:p>
           <a:p>
@@ -606,7 +615,13 @@
           <a:p>
             <a:r>
               <a:rPr lang="fr-FR" dirty="0"/>
-              <a:t>Mais pour celles et ceux qui ne me connaissent pas, je vais me présenter rapidement. Je m’appelle Thomas PIERRAIN. Cela fait 24 ans que je fais du soft pour vivre. J’ai travaillé pour des sociétés de services, pour leurs clients (forfait/régie), j’ai aussi été salarié pendant 12 ans dans une grande banque d’investissement où j’ai fait </a:t>
+              <a:t>Mais pour celles et ceux qui ne me connaissent pas, je vais me présenter rapidement pour que vous puissiez savoir d’où je parle. </a:t>
+            </a:r>
+          </a:p>
+          <a:p>
+            <a:r>
+              <a:rPr lang="fr-FR" dirty="0"/>
+              <a:t>Je m’appelle Thomas PIERRAIN. Cela fait 24 ans que je fais du soft pour vivre. J’ai travaillé pour des sociétés de services, pour leurs clients (forfait/régie), j’ai aussi été salarié pendant 12 ans dans une grande banque d’investissement où j’ai fait </a:t>
             </a:r>
             <a:r>
               <a:rPr lang="fr-FR" dirty="0" err="1"/>
@@ -614,7 +629,15 @@
             </a:r>
             <a:r>
               <a:rPr lang="fr-FR" dirty="0"/>
-              <a:t> de dev, de management et d’architecture (y compris de l’architecture d’entreprise). Et puis les 6 dernières années, je les ai passées à coder et à aider mes clients à sécuriser des projets critiques en montant et en faisant partie d’équipes de DEV efficaces (très inspiré d’</a:t>
+              <a:t> de dev, de management et d’architecture (y compris de l’architecture d’entreprise). Et puis il y a 6 ans j’ai créé la société 42 </a:t>
+            </a:r>
+            <a:r>
+              <a:rPr lang="fr-FR" dirty="0" err="1"/>
+              <a:t>skillz</a:t>
+            </a:r>
+            <a:r>
+              <a:rPr lang="fr-FR" dirty="0"/>
+              <a:t> avec mon ami Bruno Boucard, et j’ai passées tout mon temps depuis à vulgariser des trucs, à coder et à aider mes clients à sécuriser des projets critiques en montant -et en faisant partie- d’équipes de DEV efficaces (très inspiré d’</a:t>
             </a:r>
             <a:r>
               <a:rPr lang="fr-FR" dirty="0" err="1"/>
@@ -639,7 +662,7 @@
           <a:p>
             <a:r>
               <a:rPr lang="fr-FR" dirty="0"/>
-              <a:t>Dernier point : je suis co-organisateur du </a:t>
+              <a:t>Dernier point : je suis aussi co-organisateur du </a:t>
             </a:r>
             <a:r>
               <a:rPr lang="fr-FR" dirty="0" err="1"/>
@@ -672,7 +695,7 @@
           <a:p>
             <a:r>
               <a:rPr lang="fr-FR" dirty="0"/>
-              <a:t>Bon ! Les présentations étant faites, je voudrai commencer par vous poser une question :  [</a:t>
+              <a:t>Bref ! Les présentations étant faites, je voudrai commencer par vous poser une question :  [</a:t>
             </a:r>
             <a:r>
               <a:rPr lang="fr-FR" dirty="0" err="1"/>
@@ -798,9 +821,12 @@
             <a:endParaRPr lang="fr-FR" dirty="0"/>
           </a:p>
           <a:p>
+            <a:endParaRPr lang="fr-FR" dirty="0"/>
+          </a:p>
+          <a:p>
             <a:r>
               <a:rPr lang="fr-FR" dirty="0"/>
-              <a:t>https://www.google.com/url?sa=i&amp;url=https%3A%2F%2Fwww.papergeek.fr%2Fmatrix-resurrections-voici-la-folle-bande-annonce-du-4e-film-de-la-saga-2454400&amp;psig=AOvVaw1o7Y-Xsy0HiH_teeuKZfBk&amp;ust=1631438660817000&amp;source=images&amp;cd=vfe&amp;ved=0CAkQjRxqFwoTCKDG4eTM9vICFQAAAAAdAAAAABAJ</a:t>
+              <a:t>https://www.google.com/url?sa=i&amp;url=https%3A%2F%2Fwww.meilleursbrokers.com%2Fblog%2F2018%2F05%2F14%2Fcomment-devenir-trader-%25C3%25A9tudes-et-dipl%25C3%25B4mes%2F&amp;psig=AOvVaw2hSaifPFX-PPqCZ7bROabC&amp;ust=1630442766372000&amp;source=images&amp;cd=vfe&amp;ved=0CAkQjRxqFwoTCJCZ6OPO2fICFQAAAAAdAAAAABAD</a:t>
             </a:r>
           </a:p>
         </p:txBody>
@@ -831,7 +857,7 @@
     </p:spTree>
     <p:extLst>
       <p:ext uri="{BB962C8B-B14F-4D97-AF65-F5344CB8AC3E}">
-        <p14:creationId xmlns:p14="http://schemas.microsoft.com/office/powerpoint/2010/main" val="2209606645"/>
+        <p14:creationId xmlns:p14="http://schemas.microsoft.com/office/powerpoint/2010/main" val="1322526275"/>
       </p:ext>
     </p:extLst>
   </p:cSld>
@@ -891,15 +917,9 @@
             <a:endParaRPr lang="fr-FR" dirty="0"/>
           </a:p>
           <a:p>
-            <a:endParaRPr lang="fr-FR" dirty="0"/>
-          </a:p>
-          <a:p>
-            <a:endParaRPr lang="fr-FR" dirty="0"/>
-          </a:p>
-          <a:p>
             <a:r>
               <a:rPr lang="fr-FR" dirty="0"/>
-              <a:t>https://images.app.goo.gl/eU9Jrtu8zn2qWMBo9</a:t>
+              <a:t>https://www.google.com/url?sa=i&amp;url=https%3A%2F%2Fwww.papergeek.fr%2Fmatrix-resurrections-voici-la-folle-bande-annonce-du-4e-film-de-la-saga-2454400&amp;psig=AOvVaw1o7Y-Xsy0HiH_teeuKZfBk&amp;ust=1631438660817000&amp;source=images&amp;cd=vfe&amp;ved=0CAkQjRxqFwoTCKDG4eTM9vICFQAAAAAdAAAAABAJ</a:t>
             </a:r>
           </a:p>
         </p:txBody>
@@ -922,6 +942,300 @@
             <a:fld id="{788D8A45-B12B-40AF-A07B-2EBC15495A4C}" type="slidenum">
               <a:rPr lang="fr-FR" smtClean="0"/>
               <a:t>11</a:t>
+            </a:fld>
+            <a:endParaRPr lang="fr-FR"/>
+          </a:p>
+        </p:txBody>
+      </p:sp>
+    </p:spTree>
+    <p:extLst>
+      <p:ext uri="{BB962C8B-B14F-4D97-AF65-F5344CB8AC3E}">
+        <p14:creationId xmlns:p14="http://schemas.microsoft.com/office/powerpoint/2010/main" val="2209606645"/>
+      </p:ext>
+    </p:extLst>
+  </p:cSld>
+  <p:clrMapOvr>
+    <a:masterClrMapping/>
+  </p:clrMapOvr>
+</p:notes>
+</file>
+
+<file path=ppt/notesSlides/notesSlide12.xml><?xml version="1.0" encoding="utf-8"?>
+<p:notes xmlns:a="http://schemas.openxmlformats.org/drawingml/2006/main" xmlns:r="http://schemas.openxmlformats.org/officeDocument/2006/relationships" xmlns:p="http://schemas.openxmlformats.org/presentationml/2006/main">
+  <p:cSld>
+    <p:spTree>
+      <p:nvGrpSpPr>
+        <p:cNvPr id="1" name=""/>
+        <p:cNvGrpSpPr/>
+        <p:nvPr/>
+      </p:nvGrpSpPr>
+      <p:grpSpPr>
+        <a:xfrm>
+          <a:off x="0" y="0"/>
+          <a:ext cx="0" cy="0"/>
+          <a:chOff x="0" y="0"/>
+          <a:chExt cx="0" cy="0"/>
+        </a:xfrm>
+      </p:grpSpPr>
+      <p:sp>
+        <p:nvSpPr>
+          <p:cNvPr id="2" name="Slide Image Placeholder 1"/>
+          <p:cNvSpPr>
+            <a:spLocks noGrp="1" noRot="1" noChangeAspect="1"/>
+          </p:cNvSpPr>
+          <p:nvPr>
+            <p:ph type="sldImg"/>
+          </p:nvPr>
+        </p:nvSpPr>
+        <p:spPr/>
+      </p:sp>
+      <p:sp>
+        <p:nvSpPr>
+          <p:cNvPr id="3" name="Notes Placeholder 2"/>
+          <p:cNvSpPr>
+            <a:spLocks noGrp="1"/>
+          </p:cNvSpPr>
+          <p:nvPr>
+            <p:ph type="body" idx="1"/>
+          </p:nvPr>
+        </p:nvSpPr>
+        <p:spPr/>
+        <p:txBody>
+          <a:bodyPr/>
+          <a:lstStyle/>
+          <a:p>
+            <a:endParaRPr lang="fr-FR" dirty="0"/>
+          </a:p>
+          <a:p>
+            <a:endParaRPr lang="fr-FR" dirty="0"/>
+          </a:p>
+          <a:p>
+            <a:endParaRPr lang="fr-FR" dirty="0"/>
+          </a:p>
+          <a:p>
+            <a:r>
+              <a:rPr lang="fr-FR" dirty="0"/>
+              <a:t>https://www.google.com/url?sa=i&amp;url=https%3A%2F%2Fstock.adobe.com%2Ffr%2Fsearch%3Fk%3Dblas%25C3%25A9&amp;psig=AOvVaw1LJRkPkwsgWTLzHzDv1PTy&amp;ust=1630443155636000&amp;source=images&amp;cd=vfe&amp;ved=0CAkQjRxqFwoTCLjUiJ3Q2fICFQAAAAAdAAAAABAD</a:t>
+            </a:r>
+          </a:p>
+        </p:txBody>
+      </p:sp>
+      <p:sp>
+        <p:nvSpPr>
+          <p:cNvPr id="4" name="Slide Number Placeholder 3"/>
+          <p:cNvSpPr>
+            <a:spLocks noGrp="1"/>
+          </p:cNvSpPr>
+          <p:nvPr>
+            <p:ph type="sldNum" sz="quarter" idx="5"/>
+          </p:nvPr>
+        </p:nvSpPr>
+        <p:spPr/>
+        <p:txBody>
+          <a:bodyPr/>
+          <a:lstStyle/>
+          <a:p>
+            <a:fld id="{788D8A45-B12B-40AF-A07B-2EBC15495A4C}" type="slidenum">
+              <a:rPr lang="fr-FR" smtClean="0"/>
+              <a:t>12</a:t>
+            </a:fld>
+            <a:endParaRPr lang="fr-FR"/>
+          </a:p>
+        </p:txBody>
+      </p:sp>
+    </p:spTree>
+    <p:extLst>
+      <p:ext uri="{BB962C8B-B14F-4D97-AF65-F5344CB8AC3E}">
+        <p14:creationId xmlns:p14="http://schemas.microsoft.com/office/powerpoint/2010/main" val="3818338646"/>
+      </p:ext>
+    </p:extLst>
+  </p:cSld>
+  <p:clrMapOvr>
+    <a:masterClrMapping/>
+  </p:clrMapOvr>
+</p:notes>
+</file>
+
+<file path=ppt/notesSlides/notesSlide13.xml><?xml version="1.0" encoding="utf-8"?>
+<p:notes xmlns:a="http://schemas.openxmlformats.org/drawingml/2006/main" xmlns:r="http://schemas.openxmlformats.org/officeDocument/2006/relationships" xmlns:p="http://schemas.openxmlformats.org/presentationml/2006/main">
+  <p:cSld>
+    <p:spTree>
+      <p:nvGrpSpPr>
+        <p:cNvPr id="1" name=""/>
+        <p:cNvGrpSpPr/>
+        <p:nvPr/>
+      </p:nvGrpSpPr>
+      <p:grpSpPr>
+        <a:xfrm>
+          <a:off x="0" y="0"/>
+          <a:ext cx="0" cy="0"/>
+          <a:chOff x="0" y="0"/>
+          <a:chExt cx="0" cy="0"/>
+        </a:xfrm>
+      </p:grpSpPr>
+      <p:sp>
+        <p:nvSpPr>
+          <p:cNvPr id="2" name="Slide Image Placeholder 1"/>
+          <p:cNvSpPr>
+            <a:spLocks noGrp="1" noRot="1" noChangeAspect="1"/>
+          </p:cNvSpPr>
+          <p:nvPr>
+            <p:ph type="sldImg"/>
+          </p:nvPr>
+        </p:nvSpPr>
+        <p:spPr/>
+      </p:sp>
+      <p:sp>
+        <p:nvSpPr>
+          <p:cNvPr id="3" name="Notes Placeholder 2"/>
+          <p:cNvSpPr>
+            <a:spLocks noGrp="1"/>
+          </p:cNvSpPr>
+          <p:nvPr>
+            <p:ph type="body" idx="1"/>
+          </p:nvPr>
+        </p:nvSpPr>
+        <p:spPr/>
+        <p:txBody>
+          <a:bodyPr/>
+          <a:lstStyle/>
+          <a:p>
+            <a:endParaRPr lang="fr-FR" dirty="0"/>
+          </a:p>
+          <a:p>
+            <a:endParaRPr lang="fr-FR" dirty="0"/>
+          </a:p>
+          <a:p>
+            <a:endParaRPr lang="fr-FR" dirty="0"/>
+          </a:p>
+          <a:p>
+            <a:endParaRPr lang="fr-FR" dirty="0"/>
+          </a:p>
+          <a:p>
+            <a:r>
+              <a:rPr lang="fr-FR" dirty="0"/>
+              <a:t>https://www.google.com/url?sa=i&amp;url=https%3A%2F%2Fplatform.multiverse.io%2Fapprenticeships-info%2Fsoftware-developer-standard-level-4&amp;psig=AOvVaw2MZ7sGrekJ6hOYemjemhoB&amp;ust=1631532051642000&amp;source=images&amp;cd=vfe&amp;ved=0CAkQjRxqFwoTCNDVxNqo-fICFQAAAAAdAAAAABAU</a:t>
+            </a:r>
+          </a:p>
+        </p:txBody>
+      </p:sp>
+      <p:sp>
+        <p:nvSpPr>
+          <p:cNvPr id="4" name="Slide Number Placeholder 3"/>
+          <p:cNvSpPr>
+            <a:spLocks noGrp="1"/>
+          </p:cNvSpPr>
+          <p:nvPr>
+            <p:ph type="sldNum" sz="quarter" idx="5"/>
+          </p:nvPr>
+        </p:nvSpPr>
+        <p:spPr/>
+        <p:txBody>
+          <a:bodyPr/>
+          <a:lstStyle/>
+          <a:p>
+            <a:fld id="{788D8A45-B12B-40AF-A07B-2EBC15495A4C}" type="slidenum">
+              <a:rPr lang="fr-FR" smtClean="0"/>
+              <a:t>13</a:t>
+            </a:fld>
+            <a:endParaRPr lang="fr-FR"/>
+          </a:p>
+        </p:txBody>
+      </p:sp>
+    </p:spTree>
+    <p:extLst>
+      <p:ext uri="{BB962C8B-B14F-4D97-AF65-F5344CB8AC3E}">
+        <p14:creationId xmlns:p14="http://schemas.microsoft.com/office/powerpoint/2010/main" val="2379774162"/>
+      </p:ext>
+    </p:extLst>
+  </p:cSld>
+  <p:clrMapOvr>
+    <a:masterClrMapping/>
+  </p:clrMapOvr>
+</p:notes>
+</file>
+
+<file path=ppt/notesSlides/notesSlide14.xml><?xml version="1.0" encoding="utf-8"?>
+<p:notes xmlns:a="http://schemas.openxmlformats.org/drawingml/2006/main" xmlns:r="http://schemas.openxmlformats.org/officeDocument/2006/relationships" xmlns:p="http://schemas.openxmlformats.org/presentationml/2006/main">
+  <p:cSld>
+    <p:spTree>
+      <p:nvGrpSpPr>
+        <p:cNvPr id="1" name=""/>
+        <p:cNvGrpSpPr/>
+        <p:nvPr/>
+      </p:nvGrpSpPr>
+      <p:grpSpPr>
+        <a:xfrm>
+          <a:off x="0" y="0"/>
+          <a:ext cx="0" cy="0"/>
+          <a:chOff x="0" y="0"/>
+          <a:chExt cx="0" cy="0"/>
+        </a:xfrm>
+      </p:grpSpPr>
+      <p:sp>
+        <p:nvSpPr>
+          <p:cNvPr id="2" name="Slide Image Placeholder 1"/>
+          <p:cNvSpPr>
+            <a:spLocks noGrp="1" noRot="1" noChangeAspect="1"/>
+          </p:cNvSpPr>
+          <p:nvPr>
+            <p:ph type="sldImg"/>
+          </p:nvPr>
+        </p:nvSpPr>
+        <p:spPr/>
+      </p:sp>
+      <p:sp>
+        <p:nvSpPr>
+          <p:cNvPr id="3" name="Notes Placeholder 2"/>
+          <p:cNvSpPr>
+            <a:spLocks noGrp="1"/>
+          </p:cNvSpPr>
+          <p:nvPr>
+            <p:ph type="body" idx="1"/>
+          </p:nvPr>
+        </p:nvSpPr>
+        <p:spPr/>
+        <p:txBody>
+          <a:bodyPr/>
+          <a:lstStyle/>
+          <a:p>
+            <a:endParaRPr lang="fr-FR" dirty="0"/>
+          </a:p>
+          <a:p>
+            <a:endParaRPr lang="fr-FR" dirty="0"/>
+          </a:p>
+          <a:p>
+            <a:endParaRPr lang="fr-FR" dirty="0"/>
+          </a:p>
+          <a:p>
+            <a:endParaRPr lang="fr-FR" dirty="0"/>
+          </a:p>
+          <a:p>
+            <a:r>
+              <a:rPr lang="fr-FR" dirty="0"/>
+              <a:t>https://images.app.goo.gl/eU9Jrtu8zn2qWMBo9</a:t>
+            </a:r>
+          </a:p>
+        </p:txBody>
+      </p:sp>
+      <p:sp>
+        <p:nvSpPr>
+          <p:cNvPr id="4" name="Slide Number Placeholder 3"/>
+          <p:cNvSpPr>
+            <a:spLocks noGrp="1"/>
+          </p:cNvSpPr>
+          <p:nvPr>
+            <p:ph type="sldNum" sz="quarter" idx="5"/>
+          </p:nvPr>
+        </p:nvSpPr>
+        <p:spPr/>
+        <p:txBody>
+          <a:bodyPr/>
+          <a:lstStyle/>
+          <a:p>
+            <a:fld id="{788D8A45-B12B-40AF-A07B-2EBC15495A4C}" type="slidenum">
+              <a:rPr lang="fr-FR" smtClean="0"/>
+              <a:t>14</a:t>
             </a:fld>
             <a:endParaRPr lang="fr-FR"/>
           </a:p>
@@ -986,7 +1300,7 @@
           <a:p>
             <a:r>
               <a:rPr lang="fr-FR" dirty="0"/>
-              <a:t>Comment ça se passe pour vous dans vos projets, vos équipes, vos entreprises ? En particulier dans la relation entre le produit et le dev.</a:t>
+              <a:t>Comment ça se passe pour vous dans vos projets, vos équipes, vos entreprises ? En particulier dans l’articulation/la relation entre le produit et le dev.</a:t>
             </a:r>
           </a:p>
           <a:p>
@@ -1013,7 +1327,7 @@
           <a:p>
             <a:r>
               <a:rPr lang="fr-FR" dirty="0"/>
-              <a:t>Comme nous sommes nombreux ici, je ne pourrais pas vous faire toutes et tous monter sur scène pour que vous nous décriviez vos difficultés, je vais plutôt  vous raconter quelques unes que j’ai pu croiser au fil des années, des problèmes que j’ai entendu ici et là (au boulot, sur twitter, dans des </a:t>
+              <a:t>Comme nous sommes nombreuses et nombreux ici, je ne pourrais pas tous vous faire monter sur scène pour que vous nous décriviez vos difficultés, je vais plutôt  vous raconter quelques unes des difficultés que j’ai pu croiser moi au fil des années, des problèmes que j’ai entendu ici et là (au boulot, dans des </a:t>
             </a:r>
             <a:r>
               <a:rPr lang="fr-FR" dirty="0" err="1"/>
@@ -1021,7 +1335,7 @@
             </a:r>
             <a:r>
               <a:rPr lang="fr-FR" dirty="0"/>
-              <a:t>, dans des conférences comme celle-ci, etc…)</a:t>
+              <a:t>, dans des conférences comme celle-ci, sur twitter, etc…)</a:t>
             </a:r>
           </a:p>
           <a:p>
@@ -1165,7 +1479,7 @@
           <a:p>
             <a:r>
               <a:rPr lang="fr-FR" dirty="0"/>
-              <a:t>Bah oui: on demande une nouvelle </a:t>
+              <a:t>C’est vrai : on demande une nouvelle </a:t>
             </a:r>
             <a:r>
               <a:rPr lang="fr-FR" dirty="0" err="1"/>
@@ -1305,7 +1619,7 @@
           <a:p>
             <a:r>
               <a:rPr lang="fr-FR" dirty="0"/>
-              <a:t>« Et encore, si les devs faisaient preuve de pédagogie pour nous faire découvrir leur univers ou certaines subtilités… mais ils sont pleins d’acronymes, de références à des trucs techniques qui nous perdent parfois. » m’a dit…</a:t>
+              <a:t>« Et encore, si les devs faisaient preuve de pédagogie pour nous faire découvrir leur univers ou certaines subtilités… mais ils sont pleins d’acronymes, de références à des trucs techniques qui nous perdent parfois. » m’a dit une responsable marketing dans l’hôtellerie il y a quelques temps…</a:t>
             </a:r>
           </a:p>
           <a:p>
@@ -1314,7 +1628,7 @@
           <a:p>
             <a:r>
               <a:rPr lang="fr-FR" dirty="0"/>
-              <a:t>Moi j’ai vu des gens du métier ne pas avoir envie de passer pour des incultes (sur le volet technique), et préférer feindre l’ignorance, voire le mépris parfois pour leurs interlocuteurs techniques. Sans aller jusque là, j’ai vu bcp de gens du métier ne pas souhaiter passer beaucoup de temps avec les équipes de DEV, et demander à des gens un peu caméléons (comme des consultants comme moi, ou des coachs en orga ou agilité) de prendre la place des devs dans ces meetings (« pas la peine qu’on soit trop nombreux »)</a:t>
+              <a:t>Moi j’ai aussi vu des gens du métier ne pas avoir envie de passer pour des incultes (sur le volet technique), et préférer feindre l’ignorance, voire le mépris parfois pour leurs interlocuteurs techniques. Sans aller jusque là, j’ai vu bcp de gens du métier ne pas souhaiter passer beaucoup de temps avec les équipes de DEV -parce que cela leur était pénible,-et demander à des gens un peu caméléons (comme des consultants, ou des coachs en orga ou agilité) de prendre la place des devs dans ces meetings (« pas la peine qu’on soit trop nombreux » est une phrase qu’on entends très souvent dans bcp d’entreprises)</a:t>
             </a:r>
           </a:p>
           <a:p>
@@ -1428,15 +1742,7 @@
           <a:p>
             <a:r>
               <a:rPr lang="fr-FR" dirty="0"/>
-              <a:t>Combien de réunion BDD ou 3 amigos mal </a:t>
-            </a:r>
-            <a:r>
-              <a:rPr lang="fr-FR" dirty="0" err="1"/>
-              <a:t>ficellées</a:t>
-            </a:r>
-            <a:r>
-              <a:rPr lang="fr-FR" dirty="0"/>
-              <a:t> j’ai pu voir… avec tout le monde qui reste crispé/étriqué/pris en tenaille dans le formalisme Gherkin (le fameux </a:t>
+              <a:t>Combien de réunion BDD ou 3 amigos mal ficelées j’ai pu voir… avec tout le monde qui reste crispé/étriqué/pris en tenaille dans le formalisme Gherkin (le fameux </a:t>
             </a:r>
             <a:r>
               <a:rPr lang="fr-FR" dirty="0" err="1"/>
@@ -1486,7 +1792,7 @@
             </a:r>
             <a:r>
               <a:rPr lang="fr-FR" dirty="0"/>
-              <a:t> qui leur disent : « attends, c’est pas comme ça qu’il faut dire ou qu’il faut faire… » </a:t>
+              <a:t> qui leur disent : « attends, c’est pas comme ça qu’il faut dire ou qu’il faut faire… essayons de rédiger le scenario ensemble » </a:t>
             </a:r>
           </a:p>
           <a:p>
@@ -1606,7 +1912,7 @@
           <a:p>
             <a:r>
               <a:rPr lang="fr-FR" dirty="0"/>
-              <a:t>S’il te dit qu’il faut changer toute la transmission de ta bagnole, à moins de s’y connaitre un peu et de le challenger, ou d’aller consulter ailleurs pour un autre devis, tu vas le laisser faire avec un petit goût amer et une légère frustration du coup.</a:t>
+              <a:t>S’il te dit qu’il faut changer toute la transmission de ta bagnole, à moins de t’y connaitre un peu et de le challenger, ou d’aller consulter ailleurs pour un autre devis, tu vas le laisser faire avec un petit goût amer et une légère frustration du coup.</a:t>
             </a:r>
           </a:p>
           <a:p>
@@ -1733,21 +2039,178 @@
           <a:bodyPr/>
           <a:lstStyle/>
           <a:p>
+            <a:pPr marL="0" marR="0" lvl="0" indent="0" algn="l" defTabSz="914400" rtl="0" eaLnBrk="1" fontAlgn="auto" latinLnBrk="0" hangingPunct="1">
+              <a:lnSpc>
+                <a:spcPct val="100000"/>
+              </a:lnSpc>
+              <a:spcBef>
+                <a:spcPts val="0"/>
+              </a:spcBef>
+              <a:spcAft>
+                <a:spcPts val="0"/>
+              </a:spcAft>
+              <a:buClrTx/>
+              <a:buSzTx/>
+              <a:buFontTx/>
+              <a:buNone/>
+              <a:tabLst/>
+              <a:defRPr/>
+            </a:pPr>
             <a:r>
               <a:rPr lang="fr-FR" dirty="0"/>
-              <a:t>C’était il y a un petit bout de temps déjà (en 2007 ou 2009; je sais plus trop). Je travaillais à l’époque pour cette grande banque d’investissement en rouge et noir et j’étais l’architecte d’un pôle qui faisait des outils pour le trading.</a:t>
-            </a:r>
-          </a:p>
-          <a:p>
+              <a:t>C’était il y a un petit bout de temps déjà (en 2007 ou 2009; je sais plus trop). Je travaillais à l’époque pour cette grande banque d’investissement en rouge et noir et j’étais l’architecte technique d’un pôle qui faisait des outils pour le trading. Le manager du pôle de l’époque –côté IT- m’avait sollicité pour que je vienne sécuriser l’exécution d’un gros projet de refonte d’une plate-forme de </a:t>
+            </a:r>
+            <a:r>
+              <a:rPr lang="fr-FR" dirty="0" err="1"/>
+              <a:t>market-making</a:t>
+            </a:r>
+            <a:r>
+              <a:rPr lang="fr-FR" dirty="0"/>
+              <a:t> sur lequel on jouait gros vu les attentes et les investissements. </a:t>
+            </a:r>
+          </a:p>
+          <a:p>
+            <a:pPr marL="0" marR="0" lvl="0" indent="0" algn="l" defTabSz="914400" rtl="0" eaLnBrk="1" fontAlgn="auto" latinLnBrk="0" hangingPunct="1">
+              <a:lnSpc>
+                <a:spcPct val="100000"/>
+              </a:lnSpc>
+              <a:spcBef>
+                <a:spcPts val="0"/>
+              </a:spcBef>
+              <a:spcAft>
+                <a:spcPts val="0"/>
+              </a:spcAft>
+              <a:buClrTx/>
+              <a:buSzTx/>
+              <a:buFontTx/>
+              <a:buNone/>
+              <a:tabLst/>
+              <a:defRPr/>
+            </a:pPr>
             <a:endParaRPr lang="fr-FR" dirty="0"/>
           </a:p>
           <a:p>
+            <a:pPr marL="0" marR="0" lvl="0" indent="0" algn="l" defTabSz="914400" rtl="0" eaLnBrk="1" fontAlgn="auto" latinLnBrk="0" hangingPunct="1">
+              <a:lnSpc>
+                <a:spcPct val="100000"/>
+              </a:lnSpc>
+              <a:spcBef>
+                <a:spcPts val="0"/>
+              </a:spcBef>
+              <a:spcAft>
+                <a:spcPts val="0"/>
+              </a:spcAft>
+              <a:buClrTx/>
+              <a:buSzTx/>
+              <a:buFontTx/>
+              <a:buNone/>
+              <a:tabLst/>
+              <a:defRPr/>
+            </a:pPr>
+            <a:r>
+              <a:rPr lang="fr-FR" dirty="0"/>
+              <a:t>Alors, le </a:t>
+            </a:r>
+            <a:r>
+              <a:rPr lang="fr-FR" dirty="0" err="1"/>
+              <a:t>market-making</a:t>
+            </a:r>
+            <a:r>
+              <a:rPr lang="fr-FR" dirty="0"/>
+              <a:t>, ça correspond en gros à une activité de quelques banques où on va laisser certains traders faire de l’animation sur les marchés financiers en publiant en permanence des prix sur tout un tas de produit financier. Ceci est fait pour que les autres clients puissent toujours acheter ou vendre des choses : on appelle ça amener de la liquidité. C’est un peu l’équivalent de ceux qui mettent des produits en rayons dans les grandes surfaces, de telle façon à ce qu’il y ait toujours des articles dans les rayons.</a:t>
+            </a:r>
+          </a:p>
+          <a:p>
+            <a:pPr marL="0" marR="0" lvl="0" indent="0" algn="l" defTabSz="914400" rtl="0" eaLnBrk="1" fontAlgn="auto" latinLnBrk="0" hangingPunct="1">
+              <a:lnSpc>
+                <a:spcPct val="100000"/>
+              </a:lnSpc>
+              <a:spcBef>
+                <a:spcPts val="0"/>
+              </a:spcBef>
+              <a:spcAft>
+                <a:spcPts val="0"/>
+              </a:spcAft>
+              <a:buClrTx/>
+              <a:buSzTx/>
+              <a:buFontTx/>
+              <a:buNone/>
+              <a:tabLst/>
+              <a:defRPr/>
+            </a:pPr>
             <a:endParaRPr lang="fr-FR" dirty="0"/>
           </a:p>
           <a:p>
+            <a:pPr marL="0" marR="0" lvl="0" indent="0" algn="l" defTabSz="914400" rtl="0" eaLnBrk="1" fontAlgn="auto" latinLnBrk="0" hangingPunct="1">
+              <a:lnSpc>
+                <a:spcPct val="100000"/>
+              </a:lnSpc>
+              <a:spcBef>
+                <a:spcPts val="0"/>
+              </a:spcBef>
+              <a:spcAft>
+                <a:spcPts val="0"/>
+              </a:spcAft>
+              <a:buClrTx/>
+              <a:buSzTx/>
+              <a:buFontTx/>
+              <a:buNone/>
+              <a:tabLst/>
+              <a:defRPr/>
+            </a:pPr>
             <a:r>
               <a:rPr lang="fr-FR" dirty="0"/>
-              <a:t>https://www.google.com/url?sa=i&amp;url=https%3A%2F%2Fwww.meilleursbrokers.com%2Fblog%2F2018%2F05%2F14%2Fcomment-devenir-trader-%25C3%25A9tudes-et-dipl%25C3%25B4mes%2F&amp;psig=AOvVaw2hSaifPFX-PPqCZ7bROabC&amp;ust=1630442766372000&amp;source=images&amp;cd=vfe&amp;ved=0CAkQjRxqFwoTCJCZ6OPO2fICFQAAAAAdAAAAABAD</a:t>
+              <a:t>Sauf que là il s’agit de gens qui iraient déposer des produits de tout types, dans les rayons de toutes les chaines de magasins en même temps.</a:t>
+            </a:r>
+          </a:p>
+          <a:p>
+            <a:endParaRPr lang="fr-FR" dirty="0"/>
+          </a:p>
+          <a:p>
+            <a:r>
+              <a:rPr lang="fr-FR" dirty="0"/>
+              <a:t>Ok ? Donc là il s’agissait de refaire entièrement une plate-forme qui est connectée d’un côté à tous les </a:t>
+            </a:r>
+            <a:r>
+              <a:rPr lang="fr-FR" dirty="0" err="1"/>
+              <a:t>pricers</a:t>
+            </a:r>
+            <a:r>
+              <a:rPr lang="fr-FR" dirty="0"/>
+              <a:t> des traders de cette banque, et de l’autre à pleins de marchés différents (euro-</a:t>
+            </a:r>
+            <a:r>
+              <a:rPr lang="fr-FR" dirty="0" err="1"/>
+              <a:t>next</a:t>
+            </a:r>
+            <a:r>
+              <a:rPr lang="fr-FR" dirty="0"/>
+              <a:t>, London stock exchange </a:t>
+            </a:r>
+            <a:r>
+              <a:rPr lang="fr-FR" dirty="0" err="1"/>
+              <a:t>etc</a:t>
+            </a:r>
+            <a:r>
+              <a:rPr lang="fr-FR" dirty="0"/>
+              <a:t>). Et le rôle de cette plate-forme est grosso-modo de pousser en permanence des prix personnalisés pour différentes catégories de clients (on appelle ça le </a:t>
+            </a:r>
+            <a:r>
+              <a:rPr lang="fr-FR" dirty="0" err="1"/>
+              <a:t>tiering</a:t>
+            </a:r>
+            <a:r>
+              <a:rPr lang="fr-FR" dirty="0"/>
+              <a:t>, le fait de marger + avec des clients avec qui on ne veut pas traiter, et – avec nos clients préférés). Le tout effectué dans des temps rapides, de l’ordre de quelques millisecondes seulement (entrée-sortie de la banque).</a:t>
+            </a:r>
+          </a:p>
+          <a:p>
+            <a:endParaRPr lang="fr-FR" dirty="0"/>
+          </a:p>
+          <a:p>
+            <a:r>
+              <a:rPr lang="fr-FR" dirty="0"/>
+              <a:t>https://www.google.com/url?sa=i&amp;url=https%3A%2F%2Fwww.lesechos.fr%2Ffinance-marches%2Fbanque-assurances%2Fsociete-generale-accelere-le-tri-dans-ses-filiales-internationales-240664&amp;psig=AOvVaw24NtP0Ko5jWKQzfWucnylu&amp;ust=1631595349576000&amp;source=images&amp;cd=vfe&amp;ved=0CAkQjRxqFwoTCMiPjtSU-_ICFQAAAAAdAAAAABAD</a:t>
             </a:r>
           </a:p>
         </p:txBody>
@@ -1832,6 +2295,40 @@
           <a:bodyPr/>
           <a:lstStyle/>
           <a:p>
+            <a:r>
+              <a:rPr lang="fr-FR" dirty="0"/>
+              <a:t>Donc Jérôme, le manager de la partie IT était venu me chercher pour les aider côté DEV et architecture, mais le business avait confié les rênes à un jeune chef de projet très ambitieux qui travaillait à NY, et qui était un peu perçu à Paris comme le chouchou de la sponsor côté métier, qui elle - détestait elle bosser avec l’IT. Ah oui, les rivalités entre « Régions », c’était quelques chose…</a:t>
+            </a:r>
+          </a:p>
+          <a:p>
+            <a:endParaRPr lang="fr-FR" dirty="0"/>
+          </a:p>
+          <a:p>
+            <a:r>
+              <a:rPr lang="fr-FR" dirty="0"/>
+              <a:t>Ce dernier –qu’on appellera ici Sébastien- devait piloter les </a:t>
+            </a:r>
+            <a:r>
+              <a:rPr lang="fr-FR" dirty="0" err="1"/>
+              <a:t>DEVs</a:t>
+            </a:r>
+            <a:r>
+              <a:rPr lang="fr-FR" dirty="0"/>
+              <a:t>, QA et </a:t>
+            </a:r>
+            <a:r>
+              <a:rPr lang="fr-FR" dirty="0" err="1"/>
+              <a:t>BAs</a:t>
+            </a:r>
+            <a:r>
+              <a:rPr lang="fr-FR" dirty="0"/>
+              <a:t> sur le projet, mais aussi mon activité à leurs côtés. Il était presque le seul (avec Jérôme) à être en relation directe et régulière avec la sponsor du projet, donc il était devenu presque « de facto » le PO du programme.</a:t>
+            </a:r>
+          </a:p>
+          <a:p>
+            <a:endParaRPr lang="fr-FR" dirty="0"/>
+          </a:p>
+          <a:p>
             <a:endParaRPr lang="fr-FR" dirty="0"/>
           </a:p>
           <a:p>
@@ -1874,7 +2371,7 @@
     </p:spTree>
     <p:extLst>
       <p:ext uri="{BB962C8B-B14F-4D97-AF65-F5344CB8AC3E}">
-        <p14:creationId xmlns:p14="http://schemas.microsoft.com/office/powerpoint/2010/main" val="1322526275"/>
+        <p14:creationId xmlns:p14="http://schemas.microsoft.com/office/powerpoint/2010/main" val="1873239784"/>
       </p:ext>
     </p:extLst>
   </p:cSld>
@@ -1928,9 +2425,21 @@
           <a:bodyPr/>
           <a:lstStyle/>
           <a:p>
+            <a:r>
+              <a:rPr lang="fr-FR" dirty="0"/>
+              <a:t>Ca va pas</a:t>
+            </a:r>
+          </a:p>
+          <a:p>
             <a:endParaRPr lang="fr-FR" dirty="0"/>
           </a:p>
           <a:p>
+            <a:r>
+              <a:rPr lang="fr-FR" dirty="0"/>
+              <a:t>----</a:t>
+            </a:r>
+          </a:p>
+          <a:p>
             <a:endParaRPr lang="fr-FR" dirty="0"/>
           </a:p>
           <a:p>
@@ -1939,7 +2448,62 @@
           <a:p>
             <a:r>
               <a:rPr lang="fr-FR" dirty="0"/>
-              <a:t>https://www.google.com/url?sa=i&amp;url=https%3A%2F%2Fstock.adobe.com%2Ffr%2Fsearch%3Fk%3Dblas%25C3%25A9&amp;psig=AOvVaw1LJRkPkwsgWTLzHzDv1PTy&amp;ust=1630443155636000&amp;source=images&amp;cd=vfe&amp;ved=0CAkQjRxqFwoTCLjUiJ3Q2fICFQAAAAAdAAAAABAD</a:t>
+              <a:t>C’était une refonte d’un système existant et comme souvent dans ce cas, les gens espèrent faire l’économie d’une vraie analyse de ce qui est vraiment utile et de ce qui ne l’est pas vraiment. Où alors il l’a font en chambre sans vraiment communiquer les résultats aux autres…</a:t>
+            </a:r>
+          </a:p>
+          <a:p>
+            <a:endParaRPr lang="fr-FR" dirty="0"/>
+          </a:p>
+          <a:p>
+            <a:r>
+              <a:rPr lang="fr-FR" dirty="0"/>
+              <a:t>Le projet commence, pleins d’ateliers entre personnes déjà assez </a:t>
+            </a:r>
+            <a:r>
+              <a:rPr lang="fr-FR" dirty="0" err="1"/>
+              <a:t>sachantes</a:t>
+            </a:r>
+            <a:r>
+              <a:rPr lang="fr-FR" dirty="0"/>
+              <a:t>, </a:t>
+            </a:r>
+          </a:p>
+          <a:p>
+            <a:endParaRPr lang="fr-FR" dirty="0"/>
+          </a:p>
+          <a:p>
+            <a:r>
+              <a:rPr lang="fr-FR" dirty="0"/>
+              <a:t> </a:t>
+            </a:r>
+          </a:p>
+          <a:p>
+            <a:endParaRPr lang="fr-FR" dirty="0"/>
+          </a:p>
+          <a:p>
+            <a:endParaRPr lang="fr-FR" dirty="0"/>
+          </a:p>
+          <a:p>
+            <a:pPr marL="0" marR="0" lvl="0" indent="0" algn="l" defTabSz="914400" rtl="0" eaLnBrk="1" fontAlgn="auto" latinLnBrk="0" hangingPunct="1">
+              <a:lnSpc>
+                <a:spcPct val="100000"/>
+              </a:lnSpc>
+              <a:spcBef>
+                <a:spcPts val="0"/>
+              </a:spcBef>
+              <a:spcAft>
+                <a:spcPts val="0"/>
+              </a:spcAft>
+              <a:buClrTx/>
+              <a:buSzTx/>
+              <a:buFontTx/>
+              <a:buNone/>
+              <a:tabLst/>
+              <a:defRPr/>
+            </a:pPr>
+            <a:r>
+              <a:rPr lang="fr-FR" dirty="0"/>
+              <a:t>https://www.google.com/url?sa=i&amp;url=https%3A%2F%2Fwww.critikat.com%2Factualite-cine%2Fcritique%2Fwall-street-l-argent-ne-dort-jamais%2F&amp;psig=AOvVaw0_sXGzVBkkaOUd_-eQ5Ur4&amp;ust=1631595049438000&amp;source=images&amp;cd=vfe&amp;ved=0CAkQjRxqFwoTCLClorOT-_ICFQAAAAAdAAAAABAD</a:t>
             </a:r>
           </a:p>
         </p:txBody>
@@ -1970,7 +2534,7 @@
     </p:spTree>
     <p:extLst>
       <p:ext uri="{BB962C8B-B14F-4D97-AF65-F5344CB8AC3E}">
-        <p14:creationId xmlns:p14="http://schemas.microsoft.com/office/powerpoint/2010/main" val="3818338646"/>
+        <p14:creationId xmlns:p14="http://schemas.microsoft.com/office/powerpoint/2010/main" val="3376463677"/>
       </p:ext>
     </p:extLst>
   </p:cSld>
@@ -2129,7 +2693,7 @@
           <a:p>
             <a:fld id="{2E0450E2-BB8E-48D1-94E1-E4F675E29F3B}" type="datetimeFigureOut">
               <a:rPr lang="fr-FR" smtClean="0"/>
-              <a:t>11/09/2021</a:t>
+              <a:t>12/09/2021</a:t>
             </a:fld>
             <a:endParaRPr lang="fr-FR"/>
           </a:p>
@@ -2329,7 +2893,7 @@
           <a:p>
             <a:fld id="{2E0450E2-BB8E-48D1-94E1-E4F675E29F3B}" type="datetimeFigureOut">
               <a:rPr lang="fr-FR" smtClean="0"/>
-              <a:t>11/09/2021</a:t>
+              <a:t>12/09/2021</a:t>
             </a:fld>
             <a:endParaRPr lang="fr-FR"/>
           </a:p>
@@ -2539,7 +3103,7 @@
           <a:p>
             <a:fld id="{2E0450E2-BB8E-48D1-94E1-E4F675E29F3B}" type="datetimeFigureOut">
               <a:rPr lang="fr-FR" smtClean="0"/>
-              <a:t>11/09/2021</a:t>
+              <a:t>12/09/2021</a:t>
             </a:fld>
             <a:endParaRPr lang="fr-FR"/>
           </a:p>
@@ -2739,7 +3303,7 @@
           <a:p>
             <a:fld id="{2E0450E2-BB8E-48D1-94E1-E4F675E29F3B}" type="datetimeFigureOut">
               <a:rPr lang="fr-FR" smtClean="0"/>
-              <a:t>11/09/2021</a:t>
+              <a:t>12/09/2021</a:t>
             </a:fld>
             <a:endParaRPr lang="fr-FR"/>
           </a:p>
@@ -3015,7 +3579,7 @@
           <a:p>
             <a:fld id="{2E0450E2-BB8E-48D1-94E1-E4F675E29F3B}" type="datetimeFigureOut">
               <a:rPr lang="fr-FR" smtClean="0"/>
-              <a:t>11/09/2021</a:t>
+              <a:t>12/09/2021</a:t>
             </a:fld>
             <a:endParaRPr lang="fr-FR"/>
           </a:p>
@@ -3283,7 +3847,7 @@
           <a:p>
             <a:fld id="{2E0450E2-BB8E-48D1-94E1-E4F675E29F3B}" type="datetimeFigureOut">
               <a:rPr lang="fr-FR" smtClean="0"/>
-              <a:t>11/09/2021</a:t>
+              <a:t>12/09/2021</a:t>
             </a:fld>
             <a:endParaRPr lang="fr-FR"/>
           </a:p>
@@ -3698,7 +4262,7 @@
           <a:p>
             <a:fld id="{2E0450E2-BB8E-48D1-94E1-E4F675E29F3B}" type="datetimeFigureOut">
               <a:rPr lang="fr-FR" smtClean="0"/>
-              <a:t>11/09/2021</a:t>
+              <a:t>12/09/2021</a:t>
             </a:fld>
             <a:endParaRPr lang="fr-FR"/>
           </a:p>
@@ -3840,7 +4404,7 @@
           <a:p>
             <a:fld id="{2E0450E2-BB8E-48D1-94E1-E4F675E29F3B}" type="datetimeFigureOut">
               <a:rPr lang="fr-FR" smtClean="0"/>
-              <a:t>11/09/2021</a:t>
+              <a:t>12/09/2021</a:t>
             </a:fld>
             <a:endParaRPr lang="fr-FR"/>
           </a:p>
@@ -3953,7 +4517,7 @@
           <a:p>
             <a:fld id="{2E0450E2-BB8E-48D1-94E1-E4F675E29F3B}" type="datetimeFigureOut">
               <a:rPr lang="fr-FR" smtClean="0"/>
-              <a:t>11/09/2021</a:t>
+              <a:t>12/09/2021</a:t>
             </a:fld>
             <a:endParaRPr lang="fr-FR"/>
           </a:p>
@@ -4266,7 +4830,7 @@
           <a:p>
             <a:fld id="{2E0450E2-BB8E-48D1-94E1-E4F675E29F3B}" type="datetimeFigureOut">
               <a:rPr lang="fr-FR" smtClean="0"/>
-              <a:t>11/09/2021</a:t>
+              <a:t>12/09/2021</a:t>
             </a:fld>
             <a:endParaRPr lang="fr-FR"/>
           </a:p>
@@ -4555,7 +5119,7 @@
           <a:p>
             <a:fld id="{2E0450E2-BB8E-48D1-94E1-E4F675E29F3B}" type="datetimeFigureOut">
               <a:rPr lang="fr-FR" smtClean="0"/>
-              <a:t>11/09/2021</a:t>
+              <a:t>12/09/2021</a:t>
             </a:fld>
             <a:endParaRPr lang="fr-FR"/>
           </a:p>
@@ -4800,7 +5364,7 @@
             <a:fld id="{2E0450E2-BB8E-48D1-94E1-E4F675E29F3B}" type="datetimeFigureOut">
               <a:rPr lang="fr-FR" smtClean="0"/>
               <a:pPr/>
-              <a:t>11/09/2021</a:t>
+              <a:t>12/09/2021</a:t>
             </a:fld>
             <a:endParaRPr lang="fr-FR"/>
           </a:p>
@@ -5699,6 +6263,175 @@
 <file path=ppt/slides/slide10.xml><?xml version="1.0" encoding="utf-8"?>
 <p:sld xmlns:a="http://schemas.openxmlformats.org/drawingml/2006/main" xmlns:r="http://schemas.openxmlformats.org/officeDocument/2006/relationships" xmlns:p="http://schemas.openxmlformats.org/presentationml/2006/main">
   <p:cSld>
+    <p:spTree>
+      <p:nvGrpSpPr>
+        <p:cNvPr id="1" name=""/>
+        <p:cNvGrpSpPr/>
+        <p:nvPr/>
+      </p:nvGrpSpPr>
+      <p:grpSpPr>
+        <a:xfrm>
+          <a:off x="0" y="0"/>
+          <a:ext cx="0" cy="0"/>
+          <a:chOff x="0" y="0"/>
+          <a:chExt cx="0" cy="0"/>
+        </a:xfrm>
+      </p:grpSpPr>
+      <p:pic>
+        <p:nvPicPr>
+          <p:cNvPr id="3" name="Picture 2">
+            <a:extLst>
+              <a:ext uri="{FF2B5EF4-FFF2-40B4-BE49-F238E27FC236}">
+                <a16:creationId xmlns:a16="http://schemas.microsoft.com/office/drawing/2014/main" id="{ED4562C0-EA09-4CBF-B779-E331B58AAF3E}"/>
+              </a:ext>
+            </a:extLst>
+          </p:cNvPr>
+          <p:cNvPicPr>
+            <a:picLocks noChangeAspect="1"/>
+          </p:cNvPicPr>
+          <p:nvPr/>
+        </p:nvPicPr>
+        <p:blipFill>
+          <a:blip r:embed="rId3">
+            <a:extLst>
+              <a:ext uri="{28A0092B-C50C-407E-A947-70E740481C1C}">
+                <a14:useLocalDpi xmlns:a14="http://schemas.microsoft.com/office/drawing/2010/main" val="0"/>
+              </a:ext>
+            </a:extLst>
+          </a:blip>
+          <a:stretch>
+            <a:fillRect/>
+          </a:stretch>
+        </p:blipFill>
+        <p:spPr>
+          <a:xfrm>
+            <a:off x="0" y="201917"/>
+            <a:ext cx="13954897" cy="6656083"/>
+          </a:xfrm>
+          <a:prstGeom prst="rect">
+            <a:avLst/>
+          </a:prstGeom>
+        </p:spPr>
+      </p:pic>
+      <p:sp>
+        <p:nvSpPr>
+          <p:cNvPr id="8" name="Rectangle 7">
+            <a:extLst>
+              <a:ext uri="{FF2B5EF4-FFF2-40B4-BE49-F238E27FC236}">
+                <a16:creationId xmlns:a16="http://schemas.microsoft.com/office/drawing/2014/main" id="{439E5792-2D17-4C17-8CB9-D10E6F6DB008}"/>
+              </a:ext>
+            </a:extLst>
+          </p:cNvPr>
+          <p:cNvSpPr/>
+          <p:nvPr/>
+        </p:nvSpPr>
+        <p:spPr>
+          <a:xfrm>
+            <a:off x="0" y="4829784"/>
+            <a:ext cx="12192000" cy="1276281"/>
+          </a:xfrm>
+          <a:prstGeom prst="rect">
+            <a:avLst/>
+          </a:prstGeom>
+          <a:solidFill>
+            <a:schemeClr val="tx1">
+              <a:alpha val="82000"/>
+            </a:schemeClr>
+          </a:solidFill>
+          <a:ln>
+            <a:noFill/>
+          </a:ln>
+        </p:spPr>
+        <p:style>
+          <a:lnRef idx="2">
+            <a:schemeClr val="accent1">
+              <a:shade val="50000"/>
+            </a:schemeClr>
+          </a:lnRef>
+          <a:fillRef idx="1">
+            <a:schemeClr val="accent1"/>
+          </a:fillRef>
+          <a:effectRef idx="0">
+            <a:schemeClr val="accent1"/>
+          </a:effectRef>
+          <a:fontRef idx="minor">
+            <a:schemeClr val="lt1"/>
+          </a:fontRef>
+        </p:style>
+        <p:txBody>
+          <a:bodyPr rtlCol="0" anchor="ctr"/>
+          <a:lstStyle/>
+          <a:p>
+            <a:pPr algn="ctr"/>
+            <a:endParaRPr lang="fr-FR"/>
+          </a:p>
+        </p:txBody>
+      </p:sp>
+      <p:sp>
+        <p:nvSpPr>
+          <p:cNvPr id="9" name="TextBox 8">
+            <a:extLst>
+              <a:ext uri="{FF2B5EF4-FFF2-40B4-BE49-F238E27FC236}">
+                <a16:creationId xmlns:a16="http://schemas.microsoft.com/office/drawing/2014/main" id="{5911AC05-C362-40C9-9776-27BCF68ACA39}"/>
+              </a:ext>
+            </a:extLst>
+          </p:cNvPr>
+          <p:cNvSpPr txBox="1"/>
+          <p:nvPr/>
+        </p:nvSpPr>
+        <p:spPr>
+          <a:xfrm>
+            <a:off x="498796" y="5225364"/>
+            <a:ext cx="9353658" cy="523220"/>
+          </a:xfrm>
+          <a:prstGeom prst="rect">
+            <a:avLst/>
+          </a:prstGeom>
+          <a:noFill/>
+        </p:spPr>
+        <p:txBody>
+          <a:bodyPr wrap="square" rtlCol="0" anchor="ctr">
+            <a:spAutoFit/>
+          </a:bodyPr>
+          <a:lstStyle/>
+          <a:p>
+            <a:r>
+              <a:rPr lang="fr-FR" sz="2800" b="1" cap="all" dirty="0">
+                <a:solidFill>
+                  <a:srgbClr val="F9D45F"/>
+                </a:solidFill>
+                <a:latin typeface="Alte Haas Grotesk" panose="02000503000000020004" pitchFamily="2" charset="0"/>
+              </a:rPr>
+              <a:t>Relations </a:t>
+            </a:r>
+            <a:r>
+              <a:rPr lang="fr-FR" sz="2800" b="1" cap="all" dirty="0">
+                <a:solidFill>
+                  <a:srgbClr val="FAFCD7"/>
+                </a:solidFill>
+                <a:latin typeface="Alte Haas Grotesk" panose="02000503000000020004" pitchFamily="2" charset="0"/>
+              </a:rPr>
+              <a:t>entre équipes de dev</a:t>
+            </a:r>
+          </a:p>
+        </p:txBody>
+      </p:sp>
+    </p:spTree>
+    <p:extLst>
+      <p:ext uri="{BB962C8B-B14F-4D97-AF65-F5344CB8AC3E}">
+        <p14:creationId xmlns:p14="http://schemas.microsoft.com/office/powerpoint/2010/main" val="1701706574"/>
+      </p:ext>
+    </p:extLst>
+  </p:cSld>
+  <p:clrMapOvr>
+    <a:masterClrMapping/>
+  </p:clrMapOvr>
+</p:sld>
+</file>
+
+<file path=ppt/slides/slide11.xml><?xml version="1.0" encoding="utf-8"?>
+<p:sld xmlns:a="http://schemas.openxmlformats.org/drawingml/2006/main" xmlns:r="http://schemas.openxmlformats.org/officeDocument/2006/relationships" xmlns:p="http://schemas.openxmlformats.org/presentationml/2006/main">
+  <p:cSld>
     <p:bg>
       <p:bgPr>
         <a:solidFill>
@@ -5873,7 +6606,353 @@
 </p:sld>
 </file>
 
-<file path=ppt/slides/slide11.xml><?xml version="1.0" encoding="utf-8"?>
+<file path=ppt/slides/slide12.xml><?xml version="1.0" encoding="utf-8"?>
+<p:sld xmlns:a="http://schemas.openxmlformats.org/drawingml/2006/main" xmlns:r="http://schemas.openxmlformats.org/officeDocument/2006/relationships" xmlns:p="http://schemas.openxmlformats.org/presentationml/2006/main">
+  <p:cSld>
+    <p:bg>
+      <p:bgPr>
+        <a:solidFill>
+          <a:schemeClr val="tx1"/>
+        </a:solidFill>
+        <a:effectLst/>
+      </p:bgPr>
+    </p:bg>
+    <p:spTree>
+      <p:nvGrpSpPr>
+        <p:cNvPr id="1" name=""/>
+        <p:cNvGrpSpPr/>
+        <p:nvPr/>
+      </p:nvGrpSpPr>
+      <p:grpSpPr>
+        <a:xfrm>
+          <a:off x="0" y="0"/>
+          <a:ext cx="0" cy="0"/>
+          <a:chOff x="0" y="0"/>
+          <a:chExt cx="0" cy="0"/>
+        </a:xfrm>
+      </p:grpSpPr>
+      <p:pic>
+        <p:nvPicPr>
+          <p:cNvPr id="3" name="Picture 2">
+            <a:extLst>
+              <a:ext uri="{FF2B5EF4-FFF2-40B4-BE49-F238E27FC236}">
+                <a16:creationId xmlns:a16="http://schemas.microsoft.com/office/drawing/2014/main" id="{0AE73D8B-583A-4DFE-A01E-5FE4BE761A83}"/>
+              </a:ext>
+            </a:extLst>
+          </p:cNvPr>
+          <p:cNvPicPr>
+            <a:picLocks noChangeAspect="1"/>
+          </p:cNvPicPr>
+          <p:nvPr/>
+        </p:nvPicPr>
+        <p:blipFill>
+          <a:blip r:embed="rId3">
+            <a:extLst>
+              <a:ext uri="{28A0092B-C50C-407E-A947-70E740481C1C}">
+                <a14:useLocalDpi xmlns:a14="http://schemas.microsoft.com/office/drawing/2010/main" val="0"/>
+              </a:ext>
+            </a:extLst>
+          </a:blip>
+          <a:stretch>
+            <a:fillRect/>
+          </a:stretch>
+        </p:blipFill>
+        <p:spPr>
+          <a:xfrm>
+            <a:off x="0" y="228600"/>
+            <a:ext cx="12192000" cy="6400800"/>
+          </a:xfrm>
+          <a:prstGeom prst="rect">
+            <a:avLst/>
+          </a:prstGeom>
+        </p:spPr>
+      </p:pic>
+      <p:sp>
+        <p:nvSpPr>
+          <p:cNvPr id="8" name="Rectangle 7">
+            <a:extLst>
+              <a:ext uri="{FF2B5EF4-FFF2-40B4-BE49-F238E27FC236}">
+                <a16:creationId xmlns:a16="http://schemas.microsoft.com/office/drawing/2014/main" id="{439E5792-2D17-4C17-8CB9-D10E6F6DB008}"/>
+              </a:ext>
+            </a:extLst>
+          </p:cNvPr>
+          <p:cNvSpPr/>
+          <p:nvPr/>
+        </p:nvSpPr>
+        <p:spPr>
+          <a:xfrm>
+            <a:off x="0" y="4848834"/>
+            <a:ext cx="12192000" cy="1276281"/>
+          </a:xfrm>
+          <a:prstGeom prst="rect">
+            <a:avLst/>
+          </a:prstGeom>
+          <a:solidFill>
+            <a:schemeClr val="tx1">
+              <a:alpha val="82000"/>
+            </a:schemeClr>
+          </a:solidFill>
+          <a:ln>
+            <a:noFill/>
+          </a:ln>
+        </p:spPr>
+        <p:style>
+          <a:lnRef idx="2">
+            <a:schemeClr val="accent1">
+              <a:shade val="50000"/>
+            </a:schemeClr>
+          </a:lnRef>
+          <a:fillRef idx="1">
+            <a:schemeClr val="accent1"/>
+          </a:fillRef>
+          <a:effectRef idx="0">
+            <a:schemeClr val="accent1"/>
+          </a:effectRef>
+          <a:fontRef idx="minor">
+            <a:schemeClr val="lt1"/>
+          </a:fontRef>
+        </p:style>
+        <p:txBody>
+          <a:bodyPr rtlCol="0" anchor="ctr"/>
+          <a:lstStyle/>
+          <a:p>
+            <a:pPr algn="ctr"/>
+            <a:endParaRPr lang="fr-FR"/>
+          </a:p>
+        </p:txBody>
+      </p:sp>
+      <p:sp>
+        <p:nvSpPr>
+          <p:cNvPr id="9" name="TextBox 8">
+            <a:extLst>
+              <a:ext uri="{FF2B5EF4-FFF2-40B4-BE49-F238E27FC236}">
+                <a16:creationId xmlns:a16="http://schemas.microsoft.com/office/drawing/2014/main" id="{5911AC05-C362-40C9-9776-27BCF68ACA39}"/>
+              </a:ext>
+            </a:extLst>
+          </p:cNvPr>
+          <p:cNvSpPr txBox="1"/>
+          <p:nvPr/>
+        </p:nvSpPr>
+        <p:spPr>
+          <a:xfrm>
+            <a:off x="498797" y="5225364"/>
+            <a:ext cx="6225914" cy="523220"/>
+          </a:xfrm>
+          <a:prstGeom prst="rect">
+            <a:avLst/>
+          </a:prstGeom>
+          <a:noFill/>
+        </p:spPr>
+        <p:txBody>
+          <a:bodyPr wrap="square" rtlCol="0" anchor="ctr">
+            <a:spAutoFit/>
+          </a:bodyPr>
+          <a:lstStyle/>
+          <a:p>
+            <a:r>
+              <a:rPr lang="fr-FR" sz="2800" b="1" cap="all" dirty="0">
+                <a:solidFill>
+                  <a:srgbClr val="F9D45F"/>
+                </a:solidFill>
+                <a:latin typeface="Alte Haas Grotesk" panose="02000503000000020004" pitchFamily="2" charset="0"/>
+              </a:rPr>
+              <a:t>C’est Trop </a:t>
+            </a:r>
+            <a:r>
+              <a:rPr lang="fr-FR" sz="2800" b="1" cap="all" dirty="0">
+                <a:solidFill>
+                  <a:srgbClr val="FAFCD7"/>
+                </a:solidFill>
+                <a:latin typeface="Alte Haas Grotesk" panose="02000503000000020004" pitchFamily="2" charset="0"/>
+              </a:rPr>
+              <a:t>…</a:t>
+            </a:r>
+          </a:p>
+        </p:txBody>
+      </p:sp>
+    </p:spTree>
+    <p:extLst>
+      <p:ext uri="{BB962C8B-B14F-4D97-AF65-F5344CB8AC3E}">
+        <p14:creationId xmlns:p14="http://schemas.microsoft.com/office/powerpoint/2010/main" val="3176465983"/>
+      </p:ext>
+    </p:extLst>
+  </p:cSld>
+  <p:clrMapOvr>
+    <a:masterClrMapping/>
+  </p:clrMapOvr>
+</p:sld>
+</file>
+
+<file path=ppt/slides/slide13.xml><?xml version="1.0" encoding="utf-8"?>
+<p:sld xmlns:a="http://schemas.openxmlformats.org/drawingml/2006/main" xmlns:r="http://schemas.openxmlformats.org/officeDocument/2006/relationships" xmlns:p="http://schemas.openxmlformats.org/presentationml/2006/main">
+  <p:cSld>
+    <p:spTree>
+      <p:nvGrpSpPr>
+        <p:cNvPr id="1" name=""/>
+        <p:cNvGrpSpPr/>
+        <p:nvPr/>
+      </p:nvGrpSpPr>
+      <p:grpSpPr>
+        <a:xfrm>
+          <a:off x="0" y="0"/>
+          <a:ext cx="0" cy="0"/>
+          <a:chOff x="0" y="0"/>
+          <a:chExt cx="0" cy="0"/>
+        </a:xfrm>
+      </p:grpSpPr>
+      <p:pic>
+        <p:nvPicPr>
+          <p:cNvPr id="4" name="Picture 3">
+            <a:extLst>
+              <a:ext uri="{FF2B5EF4-FFF2-40B4-BE49-F238E27FC236}">
+                <a16:creationId xmlns:a16="http://schemas.microsoft.com/office/drawing/2014/main" id="{4EFCD981-CC03-41AC-8C55-44F5A7C71239}"/>
+              </a:ext>
+            </a:extLst>
+          </p:cNvPr>
+          <p:cNvPicPr>
+            <a:picLocks noChangeAspect="1"/>
+          </p:cNvPicPr>
+          <p:nvPr/>
+        </p:nvPicPr>
+        <p:blipFill>
+          <a:blip r:embed="rId3">
+            <a:extLst>
+              <a:ext uri="{28A0092B-C50C-407E-A947-70E740481C1C}">
+                <a14:useLocalDpi xmlns:a14="http://schemas.microsoft.com/office/drawing/2010/main" val="0"/>
+              </a:ext>
+            </a:extLst>
+          </a:blip>
+          <a:stretch>
+            <a:fillRect/>
+          </a:stretch>
+        </p:blipFill>
+        <p:spPr>
+          <a:xfrm>
+            <a:off x="0" y="-1143000"/>
+            <a:ext cx="12192000" cy="9144000"/>
+          </a:xfrm>
+          <a:prstGeom prst="rect">
+            <a:avLst/>
+          </a:prstGeom>
+        </p:spPr>
+      </p:pic>
+      <p:sp>
+        <p:nvSpPr>
+          <p:cNvPr id="8" name="Rectangle 7">
+            <a:extLst>
+              <a:ext uri="{FF2B5EF4-FFF2-40B4-BE49-F238E27FC236}">
+                <a16:creationId xmlns:a16="http://schemas.microsoft.com/office/drawing/2014/main" id="{439E5792-2D17-4C17-8CB9-D10E6F6DB008}"/>
+              </a:ext>
+            </a:extLst>
+          </p:cNvPr>
+          <p:cNvSpPr/>
+          <p:nvPr/>
+        </p:nvSpPr>
+        <p:spPr>
+          <a:xfrm>
+            <a:off x="0" y="4829784"/>
+            <a:ext cx="12192000" cy="1276281"/>
+          </a:xfrm>
+          <a:prstGeom prst="rect">
+            <a:avLst/>
+          </a:prstGeom>
+          <a:solidFill>
+            <a:schemeClr val="tx1">
+              <a:alpha val="82000"/>
+            </a:schemeClr>
+          </a:solidFill>
+          <a:ln>
+            <a:noFill/>
+          </a:ln>
+        </p:spPr>
+        <p:style>
+          <a:lnRef idx="2">
+            <a:schemeClr val="accent1">
+              <a:shade val="50000"/>
+            </a:schemeClr>
+          </a:lnRef>
+          <a:fillRef idx="1">
+            <a:schemeClr val="accent1"/>
+          </a:fillRef>
+          <a:effectRef idx="0">
+            <a:schemeClr val="accent1"/>
+          </a:effectRef>
+          <a:fontRef idx="minor">
+            <a:schemeClr val="lt1"/>
+          </a:fontRef>
+        </p:style>
+        <p:txBody>
+          <a:bodyPr rtlCol="0" anchor="ctr"/>
+          <a:lstStyle/>
+          <a:p>
+            <a:pPr algn="ctr"/>
+            <a:endParaRPr lang="fr-FR"/>
+          </a:p>
+        </p:txBody>
+      </p:sp>
+      <p:sp>
+        <p:nvSpPr>
+          <p:cNvPr id="9" name="TextBox 8">
+            <a:extLst>
+              <a:ext uri="{FF2B5EF4-FFF2-40B4-BE49-F238E27FC236}">
+                <a16:creationId xmlns:a16="http://schemas.microsoft.com/office/drawing/2014/main" id="{5911AC05-C362-40C9-9776-27BCF68ACA39}"/>
+              </a:ext>
+            </a:extLst>
+          </p:cNvPr>
+          <p:cNvSpPr txBox="1"/>
+          <p:nvPr/>
+        </p:nvSpPr>
+        <p:spPr>
+          <a:xfrm>
+            <a:off x="498796" y="5225364"/>
+            <a:ext cx="9353658" cy="523220"/>
+          </a:xfrm>
+          <a:prstGeom prst="rect">
+            <a:avLst/>
+          </a:prstGeom>
+          <a:noFill/>
+        </p:spPr>
+        <p:txBody>
+          <a:bodyPr wrap="square" rtlCol="0" anchor="ctr">
+            <a:spAutoFit/>
+          </a:bodyPr>
+          <a:lstStyle/>
+          <a:p>
+            <a:r>
+              <a:rPr lang="fr-FR" sz="2800" b="1" cap="all" dirty="0">
+                <a:solidFill>
+                  <a:srgbClr val="F9D45F"/>
+                </a:solidFill>
+                <a:latin typeface="Alte Haas Grotesk" panose="02000503000000020004" pitchFamily="2" charset="0"/>
+              </a:rPr>
+              <a:t>et côté</a:t>
+            </a:r>
+            <a:r>
+              <a:rPr lang="fr-FR" sz="2800" b="1" cap="all" dirty="0">
+                <a:solidFill>
+                  <a:srgbClr val="FAFCD7"/>
+                </a:solidFill>
+                <a:latin typeface="Alte Haas Grotesk" panose="02000503000000020004" pitchFamily="2" charset="0"/>
+              </a:rPr>
+              <a:t> dev maintenant…</a:t>
+            </a:r>
+          </a:p>
+        </p:txBody>
+      </p:sp>
+    </p:spTree>
+    <p:extLst>
+      <p:ext uri="{BB962C8B-B14F-4D97-AF65-F5344CB8AC3E}">
+        <p14:creationId xmlns:p14="http://schemas.microsoft.com/office/powerpoint/2010/main" val="1236732656"/>
+      </p:ext>
+    </p:extLst>
+  </p:cSld>
+  <p:clrMapOvr>
+    <a:masterClrMapping/>
+  </p:clrMapOvr>
+</p:sld>
+</file>
+
+<file path=ppt/slides/slide14.xml><?xml version="1.0" encoding="utf-8"?>
 <p:sld xmlns:a="http://schemas.openxmlformats.org/drawingml/2006/main" xmlns:r="http://schemas.openxmlformats.org/officeDocument/2006/relationships" xmlns:p="http://schemas.openxmlformats.org/presentationml/2006/main">
   <p:cSld>
     <p:spTree>
@@ -7295,10 +8374,10 @@
       </p:grpSpPr>
       <p:pic>
         <p:nvPicPr>
-          <p:cNvPr id="4" name="Picture 3">
-            <a:extLst>
-              <a:ext uri="{FF2B5EF4-FFF2-40B4-BE49-F238E27FC236}">
-                <a16:creationId xmlns:a16="http://schemas.microsoft.com/office/drawing/2014/main" id="{084864F5-0705-437D-8C54-B442CA86BB8B}"/>
+          <p:cNvPr id="3" name="Picture 2">
+            <a:extLst>
+              <a:ext uri="{FF2B5EF4-FFF2-40B4-BE49-F238E27FC236}">
+                <a16:creationId xmlns:a16="http://schemas.microsoft.com/office/drawing/2014/main" id="{536D8E5C-70AD-4641-B44D-D6685B8D287E}"/>
               </a:ext>
             </a:extLst>
           </p:cNvPr>
@@ -7351,7 +8430,7 @@
           </a:prstGeom>
           <a:solidFill>
             <a:schemeClr val="tx1">
-              <a:alpha val="82000"/>
+              <a:alpha val="78000"/>
             </a:schemeClr>
           </a:solidFill>
           <a:ln>
@@ -7418,25 +8497,7 @@
                 </a:solidFill>
                 <a:latin typeface="Alte Haas Grotesk" panose="02000503000000020004" pitchFamily="2" charset="0"/>
               </a:rPr>
-              <a:t>Once </a:t>
-            </a:r>
-            <a:r>
-              <a:rPr lang="fr-FR" sz="2800" b="1" cap="all" dirty="0" err="1">
-                <a:solidFill>
-                  <a:srgbClr val="F9D45F"/>
-                </a:solidFill>
-                <a:latin typeface="Alte Haas Grotesk" panose="02000503000000020004" pitchFamily="2" charset="0"/>
-              </a:rPr>
-              <a:t>Upon</a:t>
-            </a:r>
-            <a:r>
-              <a:rPr lang="fr-FR" sz="2800" b="1" cap="all" dirty="0">
-                <a:solidFill>
-                  <a:srgbClr val="F9D45F"/>
-                </a:solidFill>
-                <a:latin typeface="Alte Haas Grotesk" panose="02000503000000020004" pitchFamily="2" charset="0"/>
-              </a:rPr>
-              <a:t> </a:t>
+              <a:t>Once Upon </a:t>
             </a:r>
             <a:r>
               <a:rPr lang="fr-FR" sz="2800" b="1" cap="all" dirty="0">
@@ -7482,10 +8543,10 @@
       </p:grpSpPr>
       <p:pic>
         <p:nvPicPr>
-          <p:cNvPr id="3" name="Picture 2">
-            <a:extLst>
-              <a:ext uri="{FF2B5EF4-FFF2-40B4-BE49-F238E27FC236}">
-                <a16:creationId xmlns:a16="http://schemas.microsoft.com/office/drawing/2014/main" id="{ED4562C0-EA09-4CBF-B779-E331B58AAF3E}"/>
+          <p:cNvPr id="4" name="Picture 3">
+            <a:extLst>
+              <a:ext uri="{FF2B5EF4-FFF2-40B4-BE49-F238E27FC236}">
+                <a16:creationId xmlns:a16="http://schemas.microsoft.com/office/drawing/2014/main" id="{084864F5-0705-437D-8C54-B442CA86BB8B}"/>
               </a:ext>
             </a:extLst>
           </p:cNvPr>
@@ -7508,8 +8569,8 @@
         </p:blipFill>
         <p:spPr>
           <a:xfrm>
-            <a:off x="0" y="201917"/>
-            <a:ext cx="13954897" cy="6656083"/>
+            <a:off x="0" y="0"/>
+            <a:ext cx="12192000" cy="6858000"/>
           </a:xfrm>
           <a:prstGeom prst="rect">
             <a:avLst/>
@@ -7538,7 +8599,7 @@
           </a:prstGeom>
           <a:solidFill>
             <a:schemeClr val="tx1">
-              <a:alpha val="82000"/>
+              <a:alpha val="78000"/>
             </a:schemeClr>
           </a:solidFill>
           <a:ln>
@@ -7584,8 +8645,8 @@
         </p:nvSpPr>
         <p:spPr>
           <a:xfrm>
-            <a:off x="498796" y="5225364"/>
-            <a:ext cx="9353658" cy="523220"/>
+            <a:off x="498797" y="5225364"/>
+            <a:ext cx="6225914" cy="523220"/>
           </a:xfrm>
           <a:prstGeom prst="rect">
             <a:avLst/>
@@ -7599,13 +8660,22 @@
           <a:lstStyle/>
           <a:p>
             <a:r>
+              <a:rPr lang="fr-FR" sz="2800" b="1" cap="all" dirty="0" err="1">
+                <a:solidFill>
+                  <a:srgbClr val="F9D45F"/>
+                </a:solidFill>
+                <a:latin typeface="Alte Haas Grotesk" panose="02000503000000020004" pitchFamily="2" charset="0"/>
+              </a:rPr>
+              <a:t>meet</a:t>
+            </a:r>
+            <a:r>
               <a:rPr lang="fr-FR" sz="2800" b="1" cap="all" dirty="0">
                 <a:solidFill>
                   <a:srgbClr val="F9D45F"/>
                 </a:solidFill>
                 <a:latin typeface="Alte Haas Grotesk" panose="02000503000000020004" pitchFamily="2" charset="0"/>
               </a:rPr>
-              <a:t>Relations </a:t>
+              <a:t> </a:t>
             </a:r>
             <a:r>
               <a:rPr lang="fr-FR" sz="2800" b="1" cap="all" dirty="0">
@@ -7614,7 +8684,7 @@
                 </a:solidFill>
                 <a:latin typeface="Alte Haas Grotesk" panose="02000503000000020004" pitchFamily="2" charset="0"/>
               </a:rPr>
-              <a:t>entre équipes de dev</a:t>
+              <a:t>Sébastien</a:t>
             </a:r>
           </a:p>
         </p:txBody>
@@ -7622,7 +8692,7 @@
     </p:spTree>
     <p:extLst>
       <p:ext uri="{BB962C8B-B14F-4D97-AF65-F5344CB8AC3E}">
-        <p14:creationId xmlns:p14="http://schemas.microsoft.com/office/powerpoint/2010/main" val="1701706574"/>
+        <p14:creationId xmlns:p14="http://schemas.microsoft.com/office/powerpoint/2010/main" val="3541420094"/>
       </p:ext>
     </p:extLst>
   </p:cSld>
@@ -7635,14 +8705,6 @@
 <file path=ppt/slides/slide9.xml><?xml version="1.0" encoding="utf-8"?>
 <p:sld xmlns:a="http://schemas.openxmlformats.org/drawingml/2006/main" xmlns:r="http://schemas.openxmlformats.org/officeDocument/2006/relationships" xmlns:p="http://schemas.openxmlformats.org/presentationml/2006/main">
   <p:cSld>
-    <p:bg>
-      <p:bgPr>
-        <a:solidFill>
-          <a:schemeClr val="tx1"/>
-        </a:solidFill>
-        <a:effectLst/>
-      </p:bgPr>
-    </p:bg>
     <p:spTree>
       <p:nvGrpSpPr>
         <p:cNvPr id="1" name=""/>
@@ -7659,10 +8721,10 @@
       </p:grpSpPr>
       <p:pic>
         <p:nvPicPr>
-          <p:cNvPr id="3" name="Picture 2">
-            <a:extLst>
-              <a:ext uri="{FF2B5EF4-FFF2-40B4-BE49-F238E27FC236}">
-                <a16:creationId xmlns:a16="http://schemas.microsoft.com/office/drawing/2014/main" id="{0AE73D8B-583A-4DFE-A01E-5FE4BE761A83}"/>
+          <p:cNvPr id="6" name="Picture 5">
+            <a:extLst>
+              <a:ext uri="{FF2B5EF4-FFF2-40B4-BE49-F238E27FC236}">
+                <a16:creationId xmlns:a16="http://schemas.microsoft.com/office/drawing/2014/main" id="{354089ED-14A7-461B-B162-1758DD111AEA}"/>
               </a:ext>
             </a:extLst>
           </p:cNvPr>
@@ -7684,9 +8746,9 @@
           </a:stretch>
         </p:blipFill>
         <p:spPr>
-          <a:xfrm>
-            <a:off x="0" y="228600"/>
-            <a:ext cx="12192000" cy="6400800"/>
+          <a:xfrm flipH="1">
+            <a:off x="-247650" y="-800100"/>
+            <a:ext cx="12687300" cy="8458200"/>
           </a:xfrm>
           <a:prstGeom prst="rect">
             <a:avLst/>
@@ -7707,7 +8769,7 @@
         </p:nvSpPr>
         <p:spPr>
           <a:xfrm>
-            <a:off x="0" y="4848834"/>
+            <a:off x="0" y="4829784"/>
             <a:ext cx="12192000" cy="1276281"/>
           </a:xfrm>
           <a:prstGeom prst="rect">
@@ -7715,7 +8777,7 @@
           </a:prstGeom>
           <a:solidFill>
             <a:schemeClr val="tx1">
-              <a:alpha val="82000"/>
+              <a:alpha val="76000"/>
             </a:schemeClr>
           </a:solidFill>
           <a:ln>
@@ -7782,7 +8844,7 @@
                 </a:solidFill>
                 <a:latin typeface="Alte Haas Grotesk" panose="02000503000000020004" pitchFamily="2" charset="0"/>
               </a:rPr>
-              <a:t>C’est Trop </a:t>
+              <a:t>Une certaine </a:t>
             </a:r>
             <a:r>
               <a:rPr lang="fr-FR" sz="2800" b="1" cap="all" dirty="0">
@@ -7791,7 +8853,7 @@
                 </a:solidFill>
                 <a:latin typeface="Alte Haas Grotesk" panose="02000503000000020004" pitchFamily="2" charset="0"/>
               </a:rPr>
-              <a:t>…</a:t>
+              <a:t>frustration</a:t>
             </a:r>
           </a:p>
         </p:txBody>
@@ -7799,7 +8861,7 @@
     </p:spTree>
     <p:extLst>
       <p:ext uri="{BB962C8B-B14F-4D97-AF65-F5344CB8AC3E}">
-        <p14:creationId xmlns:p14="http://schemas.microsoft.com/office/powerpoint/2010/main" val="3176465983"/>
+        <p14:creationId xmlns:p14="http://schemas.microsoft.com/office/powerpoint/2010/main" val="271137622"/>
       </p:ext>
     </p:extLst>
   </p:cSld>

</xml_diff>